<commit_message>
update content and format(iva17)
</commit_message>
<xml_diff>
--- a/papers/Presentations/IVA17/IVA17.pptx
+++ b/papers/Presentations/IVA17/IVA17.pptx
@@ -141,7 +141,7 @@
   </p:defaultTextStyle>
   <p:extLst>
     <p:ext uri="{EFAFB233-063F-42B5-8137-9DF3F51BA10A}">
-      <p15:sldGuideLst xmlns:p15="http://schemas.microsoft.com/office/powerpoint/2012/main" xmlns="">
+      <p15:sldGuideLst xmlns="" xmlns:p15="http://schemas.microsoft.com/office/powerpoint/2012/main">
         <p15:guide id="1" orient="horz" pos="2160">
           <p15:clr>
             <a:srgbClr val="A4A3A4"/>
@@ -1262,27 +1262,7 @@
           <a:bodyPr/>
           <a:lstStyle/>
           <a:p>
-            <a:r>
-              <a:rPr lang="fr-FR" dirty="0"/>
-              <a:t>Une</a:t>
-            </a:r>
-            <a:r>
-              <a:rPr lang="fr-FR" baseline="0" dirty="0"/>
-              <a:t> option est défini comme le produit </a:t>
-            </a:r>
-            <a:r>
-              <a:rPr lang="fr-FR" baseline="0" dirty="0" err="1"/>
-              <a:t>cartesien</a:t>
-            </a:r>
-            <a:r>
-              <a:rPr lang="fr-FR" baseline="0" dirty="0"/>
-              <a:t> d’un ensemble de </a:t>
-            </a:r>
-            <a:r>
-              <a:rPr lang="fr-FR" baseline="0"/>
-              <a:t>criteres</a:t>
-            </a:r>
-            <a:endParaRPr lang="fr-FR"/>
+            <a:endParaRPr lang="fr-FR" dirty="0"/>
           </a:p>
         </p:txBody>
       </p:sp>
@@ -1313,6 +1293,170 @@
     <p:extLst>
       <p:ext uri="{BB962C8B-B14F-4D97-AF65-F5344CB8AC3E}">
         <p14:creationId xmlns:p14="http://schemas.microsoft.com/office/powerpoint/2010/main" val="2349789133"/>
+      </p:ext>
+    </p:extLst>
+  </p:cSld>
+  <p:clrMapOvr>
+    <a:masterClrMapping/>
+  </p:clrMapOvr>
+</p:notes>
+</file>
+
+<file path=ppt/notesSlides/notesSlide16.xml><?xml version="1.0" encoding="utf-8"?>
+<p:notes xmlns:a="http://schemas.openxmlformats.org/drawingml/2006/main" xmlns:r="http://schemas.openxmlformats.org/officeDocument/2006/relationships" xmlns:p="http://schemas.openxmlformats.org/presentationml/2006/main">
+  <p:cSld>
+    <p:spTree>
+      <p:nvGrpSpPr>
+        <p:cNvPr id="1" name=""/>
+        <p:cNvGrpSpPr/>
+        <p:nvPr/>
+      </p:nvGrpSpPr>
+      <p:grpSpPr>
+        <a:xfrm>
+          <a:off x="0" y="0"/>
+          <a:ext cx="0" cy="0"/>
+          <a:chOff x="0" y="0"/>
+          <a:chExt cx="0" cy="0"/>
+        </a:xfrm>
+      </p:grpSpPr>
+      <p:sp>
+        <p:nvSpPr>
+          <p:cNvPr id="2" name="Espace réservé de l'image des diapositives 1"/>
+          <p:cNvSpPr>
+            <a:spLocks noGrp="1" noRot="1" noChangeAspect="1"/>
+          </p:cNvSpPr>
+          <p:nvPr>
+            <p:ph type="sldImg"/>
+          </p:nvPr>
+        </p:nvSpPr>
+        <p:spPr/>
+      </p:sp>
+      <p:sp>
+        <p:nvSpPr>
+          <p:cNvPr id="3" name="Espace réservé des commentaires 2"/>
+          <p:cNvSpPr>
+            <a:spLocks noGrp="1"/>
+          </p:cNvSpPr>
+          <p:nvPr>
+            <p:ph type="body" idx="1"/>
+          </p:nvPr>
+        </p:nvSpPr>
+        <p:spPr/>
+        <p:txBody>
+          <a:bodyPr/>
+          <a:lstStyle/>
+          <a:p>
+            <a:r>
+              <a:rPr lang="fr-FR" dirty="0" smtClean="0"/>
+              <a:t>Our </a:t>
+            </a:r>
+            <a:r>
+              <a:rPr lang="fr-FR" dirty="0" err="1" smtClean="0"/>
+              <a:t>evaluation</a:t>
+            </a:r>
+            <a:r>
+              <a:rPr lang="fr-FR" dirty="0" smtClean="0"/>
+              <a:t> </a:t>
+            </a:r>
+            <a:r>
+              <a:rPr lang="fr-FR" dirty="0" err="1" smtClean="0"/>
+              <a:t>aims</a:t>
+            </a:r>
+            <a:r>
+              <a:rPr lang="fr-FR" dirty="0" smtClean="0"/>
+              <a:t> at </a:t>
+            </a:r>
+            <a:r>
+              <a:rPr lang="fr-FR" dirty="0" err="1" smtClean="0"/>
+              <a:t>proving</a:t>
+            </a:r>
+            <a:r>
+              <a:rPr lang="fr-FR" baseline="0" dirty="0" smtClean="0"/>
+              <a:t> </a:t>
+            </a:r>
+            <a:r>
+              <a:rPr lang="fr-FR" baseline="0" dirty="0" err="1" smtClean="0"/>
+              <a:t>that</a:t>
+            </a:r>
+            <a:r>
+              <a:rPr lang="fr-FR" baseline="0" dirty="0" smtClean="0"/>
+              <a:t> the dialogues </a:t>
+            </a:r>
+            <a:r>
+              <a:rPr lang="fr-FR" baseline="0" dirty="0" err="1" smtClean="0"/>
+              <a:t>produced</a:t>
+            </a:r>
+            <a:r>
+              <a:rPr lang="fr-FR" baseline="0" dirty="0" smtClean="0"/>
+              <a:t> by the model </a:t>
+            </a:r>
+            <a:r>
+              <a:rPr lang="fr-FR" baseline="0" dirty="0" err="1" smtClean="0"/>
+              <a:t>correclty</a:t>
+            </a:r>
+            <a:r>
+              <a:rPr lang="fr-FR" baseline="0" dirty="0" smtClean="0"/>
+              <a:t> </a:t>
+            </a:r>
+            <a:r>
+              <a:rPr lang="fr-FR" baseline="0" dirty="0" err="1" smtClean="0"/>
+              <a:t>exibit</a:t>
+            </a:r>
+            <a:r>
+              <a:rPr lang="fr-FR" baseline="0" dirty="0" smtClean="0"/>
+              <a:t> the </a:t>
+            </a:r>
+            <a:r>
+              <a:rPr lang="fr-FR" baseline="0" dirty="0" err="1" smtClean="0"/>
+              <a:t>behaviors</a:t>
+            </a:r>
+            <a:r>
+              <a:rPr lang="fr-FR" baseline="0" dirty="0" smtClean="0"/>
+              <a:t> of power, as </a:t>
+            </a:r>
+            <a:r>
+              <a:rPr lang="fr-FR" baseline="0" dirty="0" err="1" smtClean="0"/>
+              <a:t>described</a:t>
+            </a:r>
+            <a:r>
+              <a:rPr lang="fr-FR" baseline="0" dirty="0" smtClean="0"/>
+              <a:t> by the </a:t>
+            </a:r>
+            <a:r>
+              <a:rPr lang="fr-FR" baseline="0" dirty="0" err="1" smtClean="0"/>
+              <a:t>principles</a:t>
+            </a:r>
+            <a:endParaRPr lang="fr-FR" dirty="0"/>
+          </a:p>
+        </p:txBody>
+      </p:sp>
+      <p:sp>
+        <p:nvSpPr>
+          <p:cNvPr id="4" name="Espace réservé du numéro de diapositive 3"/>
+          <p:cNvSpPr>
+            <a:spLocks noGrp="1"/>
+          </p:cNvSpPr>
+          <p:nvPr>
+            <p:ph type="sldNum" sz="quarter" idx="10"/>
+          </p:nvPr>
+        </p:nvSpPr>
+        <p:spPr/>
+        <p:txBody>
+          <a:bodyPr/>
+          <a:lstStyle/>
+          <a:p>
+            <a:fld id="{7C5EE35D-106A-4573-A36A-3B01A1873740}" type="slidenum">
+              <a:rPr lang="fr-FR" smtClean="0"/>
+              <a:t>25</a:t>
+            </a:fld>
+            <a:endParaRPr lang="fr-FR"/>
+          </a:p>
+        </p:txBody>
+      </p:sp>
+    </p:spTree>
+    <p:extLst>
+      <p:ext uri="{BB962C8B-B14F-4D97-AF65-F5344CB8AC3E}">
+        <p14:creationId xmlns:p14="http://schemas.microsoft.com/office/powerpoint/2010/main" val="1322395765"/>
       </p:ext>
     </p:extLst>
   </p:cSld>
@@ -1413,8 +1557,13 @@
             </a:r>
             <a:r>
               <a:rPr lang="en-US" b="1" baseline="0" dirty="0"/>
-              <a:t>social behaviors</a:t>
-            </a:r>
+              <a:t>social </a:t>
+            </a:r>
+            <a:r>
+              <a:rPr lang="en-US" b="1" baseline="0" dirty="0" smtClean="0"/>
+              <a:t>behaviors</a:t>
+            </a:r>
+            <a:endParaRPr lang="en-US" b="1" baseline="0" dirty="0"/>
           </a:p>
           <a:p>
             <a:r>
@@ -1445,6 +1594,27 @@
               <a:rPr lang="en-US" b="1" baseline="0" dirty="0" smtClean="0"/>
               <a:t>collaboration</a:t>
             </a:r>
+          </a:p>
+          <a:p>
+            <a:r>
+              <a:rPr lang="en-US" b="1" baseline="0" dirty="0" smtClean="0"/>
+              <a:t>Our goal to enhance the social abilities the  context of collaboration </a:t>
+            </a:r>
+          </a:p>
+          <a:p>
+            <a:r>
+              <a:rPr lang="en-US" b="1" baseline="0" dirty="0" smtClean="0"/>
+              <a:t>We focus on the verbal behaviors and more </a:t>
+            </a:r>
+            <a:r>
+              <a:rPr lang="en-US" b="1" baseline="0" dirty="0" err="1" smtClean="0"/>
+              <a:t>precisly</a:t>
+            </a:r>
+            <a:r>
+              <a:rPr lang="en-US" b="1" baseline="0" dirty="0" smtClean="0"/>
+              <a:t> on the dialogue strategy</a:t>
+            </a:r>
+            <a:endParaRPr lang="en-US" b="1" baseline="0" dirty="0" smtClean="0"/>
           </a:p>
           <a:p>
             <a:r>
@@ -6126,7 +6296,7 @@
           <p:cNvPr id="9" name="ZoneTexte 8">
             <a:extLst>
               <a:ext uri="{FF2B5EF4-FFF2-40B4-BE49-F238E27FC236}">
-                <a16:creationId xmlns:a16="http://schemas.microsoft.com/office/drawing/2014/main" xmlns="" id="{E5C60904-3E43-4D00-A403-14829C9BA3A8}"/>
+                <a16:creationId xmlns="" xmlns:a16="http://schemas.microsoft.com/office/drawing/2014/main" id="{E5C60904-3E43-4D00-A403-14829C9BA3A8}"/>
               </a:ext>
             </a:extLst>
           </p:cNvPr>
@@ -6356,7 +6526,7 @@
           <p:cNvPr id="11" name="Rectangle 10">
             <a:extLst>
               <a:ext uri="{FF2B5EF4-FFF2-40B4-BE49-F238E27FC236}">
-                <a16:creationId xmlns:a16="http://schemas.microsoft.com/office/drawing/2014/main" xmlns="" id="{70948E37-83B5-46CC-BF55-AA82E7F50112}"/>
+                <a16:creationId xmlns="" xmlns:a16="http://schemas.microsoft.com/office/drawing/2014/main" id="{70948E37-83B5-46CC-BF55-AA82E7F50112}"/>
               </a:ext>
             </a:extLst>
           </p:cNvPr>
@@ -6450,7 +6620,7 @@
           <p:cNvPr id="14" name="Rectangle 13">
             <a:extLst>
               <a:ext uri="{FF2B5EF4-FFF2-40B4-BE49-F238E27FC236}">
-                <a16:creationId xmlns:a16="http://schemas.microsoft.com/office/drawing/2014/main" xmlns="" id="{8F3400E1-9791-4DCA-9FD2-7107CE873690}"/>
+                <a16:creationId xmlns="" xmlns:a16="http://schemas.microsoft.com/office/drawing/2014/main" id="{8F3400E1-9791-4DCA-9FD2-7107CE873690}"/>
               </a:ext>
             </a:extLst>
           </p:cNvPr>
@@ -6500,7 +6670,7 @@
           <p:cNvPr id="15" name="ZoneTexte 14">
             <a:extLst>
               <a:ext uri="{FF2B5EF4-FFF2-40B4-BE49-F238E27FC236}">
-                <a16:creationId xmlns:a16="http://schemas.microsoft.com/office/drawing/2014/main" xmlns="" id="{0686F85A-85EC-4FF7-80C4-F874B395ECED}"/>
+                <a16:creationId xmlns="" xmlns:a16="http://schemas.microsoft.com/office/drawing/2014/main" id="{0686F85A-85EC-4FF7-80C4-F874B395ECED}"/>
               </a:ext>
             </a:extLst>
           </p:cNvPr>
@@ -6601,7 +6771,7 @@
             <p:cNvPr id="5" name="Image 4">
               <a:extLst>
                 <a:ext uri="{FF2B5EF4-FFF2-40B4-BE49-F238E27FC236}">
-                  <a16:creationId xmlns:a16="http://schemas.microsoft.com/office/drawing/2014/main" xmlns="" id="{88531C78-1FC9-4FB2-8870-3BC7391B208D}"/>
+                  <a16:creationId xmlns="" xmlns:a16="http://schemas.microsoft.com/office/drawing/2014/main" id="{88531C78-1FC9-4FB2-8870-3BC7391B208D}"/>
                 </a:ext>
               </a:extLst>
             </p:cNvPr>
@@ -6635,7 +6805,7 @@
             <p:cNvPr id="24" name="Rectangle 23">
               <a:extLst>
                 <a:ext uri="{FF2B5EF4-FFF2-40B4-BE49-F238E27FC236}">
-                  <a16:creationId xmlns:a16="http://schemas.microsoft.com/office/drawing/2014/main" xmlns="" id="{D1E0FCD0-EEA8-4172-84A6-6BFEA120DCB4}"/>
+                  <a16:creationId xmlns="" xmlns:a16="http://schemas.microsoft.com/office/drawing/2014/main" id="{D1E0FCD0-EEA8-4172-84A6-6BFEA120DCB4}"/>
                 </a:ext>
               </a:extLst>
             </p:cNvPr>
@@ -6697,7 +6867,7 @@
             <p:cNvPr id="10" name="Image 9">
               <a:extLst>
                 <a:ext uri="{FF2B5EF4-FFF2-40B4-BE49-F238E27FC236}">
-                  <a16:creationId xmlns:a16="http://schemas.microsoft.com/office/drawing/2014/main" xmlns="" id="{1B33F8DA-1CDA-4BC2-BB68-60AE08CF161D}"/>
+                  <a16:creationId xmlns="" xmlns:a16="http://schemas.microsoft.com/office/drawing/2014/main" id="{1B33F8DA-1CDA-4BC2-BB68-60AE08CF161D}"/>
                 </a:ext>
               </a:extLst>
             </p:cNvPr>
@@ -7144,7 +7314,7 @@
           <p:cNvPr id="14" name="Rectangle 13">
             <a:extLst>
               <a:ext uri="{FF2B5EF4-FFF2-40B4-BE49-F238E27FC236}">
-                <a16:creationId xmlns:a16="http://schemas.microsoft.com/office/drawing/2014/main" xmlns="" id="{8F3400E1-9791-4DCA-9FD2-7107CE873690}"/>
+                <a16:creationId xmlns="" xmlns:a16="http://schemas.microsoft.com/office/drawing/2014/main" id="{8F3400E1-9791-4DCA-9FD2-7107CE873690}"/>
               </a:ext>
             </a:extLst>
           </p:cNvPr>
@@ -7194,7 +7364,7 @@
           <p:cNvPr id="19" name="Picture 2">
             <a:extLst>
               <a:ext uri="{FF2B5EF4-FFF2-40B4-BE49-F238E27FC236}">
-                <a16:creationId xmlns:a16="http://schemas.microsoft.com/office/drawing/2014/main" xmlns="" id="{1073412C-BD31-4FF8-81F8-7E47107A6CEC}"/>
+                <a16:creationId xmlns="" xmlns:a16="http://schemas.microsoft.com/office/drawing/2014/main" id="{1073412C-BD31-4FF8-81F8-7E47107A6CEC}"/>
               </a:ext>
             </a:extLst>
           </p:cNvPr>
@@ -7251,7 +7421,7 @@
           <p:cNvPr id="21" name="Picture 3">
             <a:extLst>
               <a:ext uri="{FF2B5EF4-FFF2-40B4-BE49-F238E27FC236}">
-                <a16:creationId xmlns:a16="http://schemas.microsoft.com/office/drawing/2014/main" xmlns="" id="{E5154CFA-10DE-4A93-A831-F79680320B89}"/>
+                <a16:creationId xmlns="" xmlns:a16="http://schemas.microsoft.com/office/drawing/2014/main" id="{E5154CFA-10DE-4A93-A831-F79680320B89}"/>
               </a:ext>
             </a:extLst>
           </p:cNvPr>
@@ -7320,7 +7490,7 @@
             <p:cNvPr id="13" name="Connecteur droit avec flèche 12">
               <a:extLst>
                 <a:ext uri="{FF2B5EF4-FFF2-40B4-BE49-F238E27FC236}">
-                  <a16:creationId xmlns:a16="http://schemas.microsoft.com/office/drawing/2014/main" xmlns="" id="{D65FFD6F-5568-45A2-9D5D-1CFEA9221BC5}"/>
+                  <a16:creationId xmlns="" xmlns:a16="http://schemas.microsoft.com/office/drawing/2014/main" id="{D65FFD6F-5568-45A2-9D5D-1CFEA9221BC5}"/>
                 </a:ext>
               </a:extLst>
             </p:cNvPr>
@@ -7367,7 +7537,7 @@
             <p:cNvPr id="18" name="Connecteur droit avec flèche 17">
               <a:extLst>
                 <a:ext uri="{FF2B5EF4-FFF2-40B4-BE49-F238E27FC236}">
-                  <a16:creationId xmlns:a16="http://schemas.microsoft.com/office/drawing/2014/main" xmlns="" id="{C79F3DD1-F6F3-49B9-BA90-7C1733880E4E}"/>
+                  <a16:creationId xmlns="" xmlns:a16="http://schemas.microsoft.com/office/drawing/2014/main" id="{C79F3DD1-F6F3-49B9-BA90-7C1733880E4E}"/>
                 </a:ext>
               </a:extLst>
             </p:cNvPr>
@@ -7415,7 +7585,7 @@
           <p:cNvPr id="27" name="Groupe 26">
             <a:extLst>
               <a:ext uri="{FF2B5EF4-FFF2-40B4-BE49-F238E27FC236}">
-                <a16:creationId xmlns:a16="http://schemas.microsoft.com/office/drawing/2014/main" xmlns="" id="{9FB81528-92BE-44B0-A33B-8DD173C643EF}"/>
+                <a16:creationId xmlns="" xmlns:a16="http://schemas.microsoft.com/office/drawing/2014/main" id="{9FB81528-92BE-44B0-A33B-8DD173C643EF}"/>
               </a:ext>
             </a:extLst>
           </p:cNvPr>
@@ -7435,7 +7605,7 @@
             <p:cNvPr id="25" name="Rectangle 24">
               <a:extLst>
                 <a:ext uri="{FF2B5EF4-FFF2-40B4-BE49-F238E27FC236}">
-                  <a16:creationId xmlns:a16="http://schemas.microsoft.com/office/drawing/2014/main" xmlns="" id="{B5B55A3B-4C34-4F54-AB3C-6C0AEB43B0A6}"/>
+                  <a16:creationId xmlns="" xmlns:a16="http://schemas.microsoft.com/office/drawing/2014/main" id="{B5B55A3B-4C34-4F54-AB3C-6C0AEB43B0A6}"/>
                 </a:ext>
               </a:extLst>
             </p:cNvPr>
@@ -7488,7 +7658,7 @@
             <p:cNvPr id="26" name="Rectangle 25">
               <a:extLst>
                 <a:ext uri="{FF2B5EF4-FFF2-40B4-BE49-F238E27FC236}">
-                  <a16:creationId xmlns:a16="http://schemas.microsoft.com/office/drawing/2014/main" xmlns="" id="{631F6DC2-FA6D-416F-9457-D644F2D3ED7E}"/>
+                  <a16:creationId xmlns="" xmlns:a16="http://schemas.microsoft.com/office/drawing/2014/main" id="{631F6DC2-FA6D-416F-9457-D644F2D3ED7E}"/>
                 </a:ext>
               </a:extLst>
             </p:cNvPr>
@@ -7537,7 +7707,7 @@
             <p:cNvPr id="22" name="Rectangle 21">
               <a:extLst>
                 <a:ext uri="{FF2B5EF4-FFF2-40B4-BE49-F238E27FC236}">
-                  <a16:creationId xmlns:a16="http://schemas.microsoft.com/office/drawing/2014/main" xmlns="" id="{7BCAE013-9CC5-4E12-8D7C-E20C0CA38EC7}"/>
+                  <a16:creationId xmlns="" xmlns:a16="http://schemas.microsoft.com/office/drawing/2014/main" id="{7BCAE013-9CC5-4E12-8D7C-E20C0CA38EC7}"/>
                 </a:ext>
               </a:extLst>
             </p:cNvPr>
@@ -7587,7 +7757,7 @@
             <p:cNvPr id="29" name="Rectangle 28">
               <a:extLst>
                 <a:ext uri="{FF2B5EF4-FFF2-40B4-BE49-F238E27FC236}">
-                  <a16:creationId xmlns:a16="http://schemas.microsoft.com/office/drawing/2014/main" xmlns="" id="{8AF8BB87-58CC-4C6C-AD11-5D8C87FEE763}"/>
+                  <a16:creationId xmlns="" xmlns:a16="http://schemas.microsoft.com/office/drawing/2014/main" id="{8AF8BB87-58CC-4C6C-AD11-5D8C87FEE763}"/>
                 </a:ext>
               </a:extLst>
             </p:cNvPr>
@@ -7920,7 +8090,7 @@
           <p:cNvPr id="14" name="Rectangle 13">
             <a:extLst>
               <a:ext uri="{FF2B5EF4-FFF2-40B4-BE49-F238E27FC236}">
-                <a16:creationId xmlns:a16="http://schemas.microsoft.com/office/drawing/2014/main" xmlns="" id="{8F3400E1-9791-4DCA-9FD2-7107CE873690}"/>
+                <a16:creationId xmlns="" xmlns:a16="http://schemas.microsoft.com/office/drawing/2014/main" id="{8F3400E1-9791-4DCA-9FD2-7107CE873690}"/>
               </a:ext>
             </a:extLst>
           </p:cNvPr>
@@ -7970,7 +8140,7 @@
           <p:cNvPr id="21" name="Picture 3">
             <a:extLst>
               <a:ext uri="{FF2B5EF4-FFF2-40B4-BE49-F238E27FC236}">
-                <a16:creationId xmlns:a16="http://schemas.microsoft.com/office/drawing/2014/main" xmlns="" id="{E5154CFA-10DE-4A93-A831-F79680320B89}"/>
+                <a16:creationId xmlns="" xmlns:a16="http://schemas.microsoft.com/office/drawing/2014/main" id="{E5154CFA-10DE-4A93-A831-F79680320B89}"/>
               </a:ext>
             </a:extLst>
           </p:cNvPr>
@@ -8044,7 +8214,7 @@
             <p:cNvPr id="13" name="Connecteur droit avec flèche 12">
               <a:extLst>
                 <a:ext uri="{FF2B5EF4-FFF2-40B4-BE49-F238E27FC236}">
-                  <a16:creationId xmlns:a16="http://schemas.microsoft.com/office/drawing/2014/main" xmlns="" id="{D65FFD6F-5568-45A2-9D5D-1CFEA9221BC5}"/>
+                  <a16:creationId xmlns="" xmlns:a16="http://schemas.microsoft.com/office/drawing/2014/main" id="{D65FFD6F-5568-45A2-9D5D-1CFEA9221BC5}"/>
                 </a:ext>
               </a:extLst>
             </p:cNvPr>
@@ -8091,7 +8261,7 @@
             <p:cNvPr id="18" name="Connecteur droit avec flèche 17">
               <a:extLst>
                 <a:ext uri="{FF2B5EF4-FFF2-40B4-BE49-F238E27FC236}">
-                  <a16:creationId xmlns:a16="http://schemas.microsoft.com/office/drawing/2014/main" xmlns="" id="{C79F3DD1-F6F3-49B9-BA90-7C1733880E4E}"/>
+                  <a16:creationId xmlns="" xmlns:a16="http://schemas.microsoft.com/office/drawing/2014/main" id="{C79F3DD1-F6F3-49B9-BA90-7C1733880E4E}"/>
                 </a:ext>
               </a:extLst>
             </p:cNvPr>
@@ -8182,7 +8352,7 @@
           <p:cNvPr id="23" name="Groupe 22">
             <a:extLst>
               <a:ext uri="{FF2B5EF4-FFF2-40B4-BE49-F238E27FC236}">
-                <a16:creationId xmlns:a16="http://schemas.microsoft.com/office/drawing/2014/main" xmlns="" id="{61C42AF2-A37B-4024-9CC7-BCA09014BEE4}"/>
+                <a16:creationId xmlns="" xmlns:a16="http://schemas.microsoft.com/office/drawing/2014/main" id="{61C42AF2-A37B-4024-9CC7-BCA09014BEE4}"/>
               </a:ext>
             </a:extLst>
           </p:cNvPr>
@@ -8202,7 +8372,7 @@
             <p:cNvPr id="24" name="Rectangle 23">
               <a:extLst>
                 <a:ext uri="{FF2B5EF4-FFF2-40B4-BE49-F238E27FC236}">
-                  <a16:creationId xmlns:a16="http://schemas.microsoft.com/office/drawing/2014/main" xmlns="" id="{C07CE433-4FF7-4ADB-BF26-D3C838D0ADCB}"/>
+                  <a16:creationId xmlns="" xmlns:a16="http://schemas.microsoft.com/office/drawing/2014/main" id="{C07CE433-4FF7-4ADB-BF26-D3C838D0ADCB}"/>
                 </a:ext>
               </a:extLst>
             </p:cNvPr>
@@ -8257,7 +8427,7 @@
             <p:cNvPr id="28" name="ZoneTexte 27">
               <a:extLst>
                 <a:ext uri="{FF2B5EF4-FFF2-40B4-BE49-F238E27FC236}">
-                  <a16:creationId xmlns:a16="http://schemas.microsoft.com/office/drawing/2014/main" xmlns="" id="{E46FE502-2DAF-4FD4-8D95-8472B9631A90}"/>
+                  <a16:creationId xmlns="" xmlns:a16="http://schemas.microsoft.com/office/drawing/2014/main" id="{E46FE502-2DAF-4FD4-8D95-8472B9631A90}"/>
                 </a:ext>
               </a:extLst>
             </p:cNvPr>
@@ -8355,7 +8525,7 @@
           <p:cNvPr id="30" name="Picture 2" descr="E:\presentation\satother.png">
             <a:extLst>
               <a:ext uri="{FF2B5EF4-FFF2-40B4-BE49-F238E27FC236}">
-                <a16:creationId xmlns:a16="http://schemas.microsoft.com/office/drawing/2014/main" xmlns="" id="{A8B3CF2C-3A89-4C25-B986-383723A4035F}"/>
+                <a16:creationId xmlns="" xmlns:a16="http://schemas.microsoft.com/office/drawing/2014/main" id="{A8B3CF2C-3A89-4C25-B986-383723A4035F}"/>
               </a:ext>
             </a:extLst>
           </p:cNvPr>
@@ -8402,7 +8572,7 @@
           <p:cNvPr id="31" name="ZoneTexte 30">
             <a:extLst>
               <a:ext uri="{FF2B5EF4-FFF2-40B4-BE49-F238E27FC236}">
-                <a16:creationId xmlns:a16="http://schemas.microsoft.com/office/drawing/2014/main" xmlns="" id="{94FA61C2-B84D-4556-BEC7-664B4B1053EB}"/>
+                <a16:creationId xmlns="" xmlns:a16="http://schemas.microsoft.com/office/drawing/2014/main" id="{94FA61C2-B84D-4556-BEC7-664B4B1053EB}"/>
               </a:ext>
             </a:extLst>
           </p:cNvPr>
@@ -8521,7 +8691,7 @@
           <p:cNvPr id="32" name="Rectangle 31">
             <a:extLst>
               <a:ext uri="{FF2B5EF4-FFF2-40B4-BE49-F238E27FC236}">
-                <a16:creationId xmlns:a16="http://schemas.microsoft.com/office/drawing/2014/main" xmlns="" id="{D1E0FCD0-EEA8-4172-84A6-6BFEA120DCB4}"/>
+                <a16:creationId xmlns="" xmlns:a16="http://schemas.microsoft.com/office/drawing/2014/main" id="{D1E0FCD0-EEA8-4172-84A6-6BFEA120DCB4}"/>
               </a:ext>
             </a:extLst>
           </p:cNvPr>
@@ -8713,7 +8883,7 @@
           <p:cNvPr id="25" name="Picture 2">
             <a:extLst>
               <a:ext uri="{FF2B5EF4-FFF2-40B4-BE49-F238E27FC236}">
-                <a16:creationId xmlns:a16="http://schemas.microsoft.com/office/drawing/2014/main" xmlns="" id="{1073412C-BD31-4FF8-81F8-7E47107A6CEC}"/>
+                <a16:creationId xmlns="" xmlns:a16="http://schemas.microsoft.com/office/drawing/2014/main" id="{1073412C-BD31-4FF8-81F8-7E47107A6CEC}"/>
               </a:ext>
             </a:extLst>
           </p:cNvPr>
@@ -9059,7 +9229,7 @@
           <p:cNvPr id="14" name="Rectangle 13">
             <a:extLst>
               <a:ext uri="{FF2B5EF4-FFF2-40B4-BE49-F238E27FC236}">
-                <a16:creationId xmlns:a16="http://schemas.microsoft.com/office/drawing/2014/main" xmlns="" id="{8F3400E1-9791-4DCA-9FD2-7107CE873690}"/>
+                <a16:creationId xmlns="" xmlns:a16="http://schemas.microsoft.com/office/drawing/2014/main" id="{8F3400E1-9791-4DCA-9FD2-7107CE873690}"/>
               </a:ext>
             </a:extLst>
           </p:cNvPr>
@@ -9109,7 +9279,7 @@
           <p:cNvPr id="21" name="Picture 3">
             <a:extLst>
               <a:ext uri="{FF2B5EF4-FFF2-40B4-BE49-F238E27FC236}">
-                <a16:creationId xmlns:a16="http://schemas.microsoft.com/office/drawing/2014/main" xmlns="" id="{E5154CFA-10DE-4A93-A831-F79680320B89}"/>
+                <a16:creationId xmlns="" xmlns:a16="http://schemas.microsoft.com/office/drawing/2014/main" id="{E5154CFA-10DE-4A93-A831-F79680320B89}"/>
               </a:ext>
             </a:extLst>
           </p:cNvPr>
@@ -9183,7 +9353,7 @@
             <p:cNvPr id="13" name="Connecteur droit avec flèche 12">
               <a:extLst>
                 <a:ext uri="{FF2B5EF4-FFF2-40B4-BE49-F238E27FC236}">
-                  <a16:creationId xmlns:a16="http://schemas.microsoft.com/office/drawing/2014/main" xmlns="" id="{D65FFD6F-5568-45A2-9D5D-1CFEA9221BC5}"/>
+                  <a16:creationId xmlns="" xmlns:a16="http://schemas.microsoft.com/office/drawing/2014/main" id="{D65FFD6F-5568-45A2-9D5D-1CFEA9221BC5}"/>
                 </a:ext>
               </a:extLst>
             </p:cNvPr>
@@ -9230,7 +9400,7 @@
             <p:cNvPr id="18" name="Connecteur droit avec flèche 17">
               <a:extLst>
                 <a:ext uri="{FF2B5EF4-FFF2-40B4-BE49-F238E27FC236}">
-                  <a16:creationId xmlns:a16="http://schemas.microsoft.com/office/drawing/2014/main" xmlns="" id="{C79F3DD1-F6F3-49B9-BA90-7C1733880E4E}"/>
+                  <a16:creationId xmlns="" xmlns:a16="http://schemas.microsoft.com/office/drawing/2014/main" id="{C79F3DD1-F6F3-49B9-BA90-7C1733880E4E}"/>
                 </a:ext>
               </a:extLst>
             </p:cNvPr>
@@ -9321,7 +9491,7 @@
           <p:cNvPr id="31" name="ZoneTexte 30">
             <a:extLst>
               <a:ext uri="{FF2B5EF4-FFF2-40B4-BE49-F238E27FC236}">
-                <a16:creationId xmlns:a16="http://schemas.microsoft.com/office/drawing/2014/main" xmlns="" id="{94FA61C2-B84D-4556-BEC7-664B4B1053EB}"/>
+                <a16:creationId xmlns="" xmlns:a16="http://schemas.microsoft.com/office/drawing/2014/main" id="{94FA61C2-B84D-4556-BEC7-664B4B1053EB}"/>
               </a:ext>
             </a:extLst>
           </p:cNvPr>
@@ -9440,7 +9610,7 @@
           <p:cNvPr id="22" name="ZoneTexte 21">
             <a:extLst>
               <a:ext uri="{FF2B5EF4-FFF2-40B4-BE49-F238E27FC236}">
-                <a16:creationId xmlns:a16="http://schemas.microsoft.com/office/drawing/2014/main" xmlns="" id="{94FA61C2-B84D-4556-BEC7-664B4B1053EB}"/>
+                <a16:creationId xmlns="" xmlns:a16="http://schemas.microsoft.com/office/drawing/2014/main" id="{94FA61C2-B84D-4556-BEC7-664B4B1053EB}"/>
               </a:ext>
             </a:extLst>
           </p:cNvPr>
@@ -9559,7 +9729,7 @@
           <p:cNvPr id="25" name="Groupe 24">
             <a:extLst>
               <a:ext uri="{FF2B5EF4-FFF2-40B4-BE49-F238E27FC236}">
-                <a16:creationId xmlns:a16="http://schemas.microsoft.com/office/drawing/2014/main" xmlns="" id="{61C42AF2-A37B-4024-9CC7-BCA09014BEE4}"/>
+                <a16:creationId xmlns="" xmlns:a16="http://schemas.microsoft.com/office/drawing/2014/main" id="{61C42AF2-A37B-4024-9CC7-BCA09014BEE4}"/>
               </a:ext>
             </a:extLst>
           </p:cNvPr>
@@ -9579,7 +9749,7 @@
             <p:cNvPr id="26" name="Rectangle 25">
               <a:extLst>
                 <a:ext uri="{FF2B5EF4-FFF2-40B4-BE49-F238E27FC236}">
-                  <a16:creationId xmlns:a16="http://schemas.microsoft.com/office/drawing/2014/main" xmlns="" id="{C07CE433-4FF7-4ADB-BF26-D3C838D0ADCB}"/>
+                  <a16:creationId xmlns="" xmlns:a16="http://schemas.microsoft.com/office/drawing/2014/main" id="{C07CE433-4FF7-4ADB-BF26-D3C838D0ADCB}"/>
                 </a:ext>
               </a:extLst>
             </p:cNvPr>
@@ -9630,7 +9800,7 @@
             <p:cNvPr id="27" name="ZoneTexte 26">
               <a:extLst>
                 <a:ext uri="{FF2B5EF4-FFF2-40B4-BE49-F238E27FC236}">
-                  <a16:creationId xmlns:a16="http://schemas.microsoft.com/office/drawing/2014/main" xmlns="" id="{E46FE502-2DAF-4FD4-8D95-8472B9631A90}"/>
+                  <a16:creationId xmlns="" xmlns:a16="http://schemas.microsoft.com/office/drawing/2014/main" id="{E46FE502-2DAF-4FD4-8D95-8472B9631A90}"/>
                 </a:ext>
               </a:extLst>
             </p:cNvPr>
@@ -9826,7 +9996,7 @@
           <p:cNvPr id="29" name="ZoneTexte 28">
             <a:extLst>
               <a:ext uri="{FF2B5EF4-FFF2-40B4-BE49-F238E27FC236}">
-                <a16:creationId xmlns:a16="http://schemas.microsoft.com/office/drawing/2014/main" xmlns="" id="{345CBD4C-02A4-49D0-A86D-41CBBF812EEF}"/>
+                <a16:creationId xmlns="" xmlns:a16="http://schemas.microsoft.com/office/drawing/2014/main" id="{345CBD4C-02A4-49D0-A86D-41CBBF812EEF}"/>
               </a:ext>
             </a:extLst>
           </p:cNvPr>
@@ -9893,7 +10063,7 @@
           <p:cNvPr id="33" name="Rectangle 32">
             <a:extLst>
               <a:ext uri="{FF2B5EF4-FFF2-40B4-BE49-F238E27FC236}">
-                <a16:creationId xmlns:a16="http://schemas.microsoft.com/office/drawing/2014/main" xmlns="" id="{09B04511-0B48-468D-8610-00249895752A}"/>
+                <a16:creationId xmlns="" xmlns:a16="http://schemas.microsoft.com/office/drawing/2014/main" id="{09B04511-0B48-468D-8610-00249895752A}"/>
               </a:ext>
             </a:extLst>
           </p:cNvPr>
@@ -9985,7 +10155,7 @@
           <p:cNvPr id="23" name="Picture 2">
             <a:extLst>
               <a:ext uri="{FF2B5EF4-FFF2-40B4-BE49-F238E27FC236}">
-                <a16:creationId xmlns:a16="http://schemas.microsoft.com/office/drawing/2014/main" xmlns="" id="{1073412C-BD31-4FF8-81F8-7E47107A6CEC}"/>
+                <a16:creationId xmlns="" xmlns:a16="http://schemas.microsoft.com/office/drawing/2014/main" id="{1073412C-BD31-4FF8-81F8-7E47107A6CEC}"/>
               </a:ext>
             </a:extLst>
           </p:cNvPr>
@@ -10962,7 +11132,7 @@
           <p:cNvPr id="16" name="Titre 1">
             <a:extLst>
               <a:ext uri="{FF2B5EF4-FFF2-40B4-BE49-F238E27FC236}">
-                <a16:creationId xmlns:a16="http://schemas.microsoft.com/office/drawing/2014/main" xmlns="" id="{6F7FC47C-E66C-4AF5-AA17-09356D3F5226}"/>
+                <a16:creationId xmlns="" xmlns:a16="http://schemas.microsoft.com/office/drawing/2014/main" id="{6F7FC47C-E66C-4AF5-AA17-09356D3F5226}"/>
               </a:ext>
             </a:extLst>
           </p:cNvPr>
@@ -11006,7 +11176,7 @@
           <p:cNvPr id="14" name="Image 13">
             <a:extLst>
               <a:ext uri="{FF2B5EF4-FFF2-40B4-BE49-F238E27FC236}">
-                <a16:creationId xmlns:a16="http://schemas.microsoft.com/office/drawing/2014/main" xmlns="" id="{1556E920-2D39-49D1-BF92-ED760E2E94D4}"/>
+                <a16:creationId xmlns="" xmlns:a16="http://schemas.microsoft.com/office/drawing/2014/main" id="{1556E920-2D39-49D1-BF92-ED760E2E94D4}"/>
               </a:ext>
             </a:extLst>
           </p:cNvPr>
@@ -11042,7 +11212,7 @@
           <p:cNvPr id="20" name="Rectangle 19">
             <a:extLst>
               <a:ext uri="{FF2B5EF4-FFF2-40B4-BE49-F238E27FC236}">
-                <a16:creationId xmlns:a16="http://schemas.microsoft.com/office/drawing/2014/main" xmlns="" id="{4FF44B8E-1846-45A9-B114-3098B6B8CB1C}"/>
+                <a16:creationId xmlns="" xmlns:a16="http://schemas.microsoft.com/office/drawing/2014/main" id="{4FF44B8E-1846-45A9-B114-3098B6B8CB1C}"/>
               </a:ext>
             </a:extLst>
           </p:cNvPr>
@@ -11103,7 +11273,7 @@
             <p:cNvPr id="26" name="Rectangle 25">
               <a:extLst>
                 <a:ext uri="{FF2B5EF4-FFF2-40B4-BE49-F238E27FC236}">
-                  <a16:creationId xmlns:a16="http://schemas.microsoft.com/office/drawing/2014/main" xmlns="" id="{C8E014B8-8F69-45D0-BC88-472428DD5014}"/>
+                  <a16:creationId xmlns="" xmlns:a16="http://schemas.microsoft.com/office/drawing/2014/main" id="{C8E014B8-8F69-45D0-BC88-472428DD5014}"/>
                 </a:ext>
               </a:extLst>
             </p:cNvPr>
@@ -11197,7 +11367,7 @@
             <p:cNvPr id="25" name="Rectangle 24">
               <a:extLst>
                 <a:ext uri="{FF2B5EF4-FFF2-40B4-BE49-F238E27FC236}">
-                  <a16:creationId xmlns:a16="http://schemas.microsoft.com/office/drawing/2014/main" xmlns="" id="{F8C44AB9-A5E4-4160-AE24-DA78158D6810}"/>
+                  <a16:creationId xmlns="" xmlns:a16="http://schemas.microsoft.com/office/drawing/2014/main" id="{F8C44AB9-A5E4-4160-AE24-DA78158D6810}"/>
                 </a:ext>
               </a:extLst>
             </p:cNvPr>
@@ -11251,7 +11421,7 @@
           <p:cNvPr id="4" name="ZoneTexte 3">
             <a:extLst>
               <a:ext uri="{FF2B5EF4-FFF2-40B4-BE49-F238E27FC236}">
-                <a16:creationId xmlns:a16="http://schemas.microsoft.com/office/drawing/2014/main" xmlns="" id="{23EB7785-DF90-40C0-8BD2-FD80B6A592B2}"/>
+                <a16:creationId xmlns="" xmlns:a16="http://schemas.microsoft.com/office/drawing/2014/main" id="{23EB7785-DF90-40C0-8BD2-FD80B6A592B2}"/>
               </a:ext>
             </a:extLst>
           </p:cNvPr>
@@ -11394,7 +11564,7 @@
             <p:cNvPr id="24" name="Rectangle 23">
               <a:extLst>
                 <a:ext uri="{FF2B5EF4-FFF2-40B4-BE49-F238E27FC236}">
-                  <a16:creationId xmlns:a16="http://schemas.microsoft.com/office/drawing/2014/main" xmlns="" id="{34E8D74E-F19B-4494-9DBD-DE8B735FB8C1}"/>
+                  <a16:creationId xmlns="" xmlns:a16="http://schemas.microsoft.com/office/drawing/2014/main" id="{34E8D74E-F19B-4494-9DBD-DE8B735FB8C1}"/>
                 </a:ext>
               </a:extLst>
             </p:cNvPr>
@@ -11444,7 +11614,7 @@
             <p:cNvPr id="19" name="Rectangle 18">
               <a:extLst>
                 <a:ext uri="{FF2B5EF4-FFF2-40B4-BE49-F238E27FC236}">
-                  <a16:creationId xmlns:a16="http://schemas.microsoft.com/office/drawing/2014/main" xmlns="" id="{C8E014B8-8F69-45D0-BC88-472428DD5014}"/>
+                  <a16:creationId xmlns="" xmlns:a16="http://schemas.microsoft.com/office/drawing/2014/main" id="{C8E014B8-8F69-45D0-BC88-472428DD5014}"/>
                 </a:ext>
               </a:extLst>
             </p:cNvPr>
@@ -11495,7 +11665,7 @@
             <p:cNvPr id="27" name="Rectangle 26">
               <a:extLst>
                 <a:ext uri="{FF2B5EF4-FFF2-40B4-BE49-F238E27FC236}">
-                  <a16:creationId xmlns:a16="http://schemas.microsoft.com/office/drawing/2014/main" xmlns="" id="{B5B55A3B-4C34-4F54-AB3C-6C0AEB43B0A6}"/>
+                  <a16:creationId xmlns="" xmlns:a16="http://schemas.microsoft.com/office/drawing/2014/main" id="{B5B55A3B-4C34-4F54-AB3C-6C0AEB43B0A6}"/>
                 </a:ext>
               </a:extLst>
             </p:cNvPr>
@@ -11552,7 +11722,7 @@
             <p:cNvPr id="28" name="Rectangle 27">
               <a:extLst>
                 <a:ext uri="{FF2B5EF4-FFF2-40B4-BE49-F238E27FC236}">
-                  <a16:creationId xmlns:a16="http://schemas.microsoft.com/office/drawing/2014/main" xmlns="" id="{631F6DC2-FA6D-416F-9457-D644F2D3ED7E}"/>
+                  <a16:creationId xmlns="" xmlns:a16="http://schemas.microsoft.com/office/drawing/2014/main" id="{631F6DC2-FA6D-416F-9457-D644F2D3ED7E}"/>
                 </a:ext>
               </a:extLst>
             </p:cNvPr>
@@ -11620,7 +11790,7 @@
             <p:cNvPr id="23" name="Rectangle 22">
               <a:extLst>
                 <a:ext uri="{FF2B5EF4-FFF2-40B4-BE49-F238E27FC236}">
-                  <a16:creationId xmlns:a16="http://schemas.microsoft.com/office/drawing/2014/main" xmlns="" id="{3E646E85-9F24-4829-9A4B-833B474F4994}"/>
+                  <a16:creationId xmlns="" xmlns:a16="http://schemas.microsoft.com/office/drawing/2014/main" id="{3E646E85-9F24-4829-9A4B-833B474F4994}"/>
                 </a:ext>
               </a:extLst>
             </p:cNvPr>
@@ -11713,7 +11883,7 @@
             <p:cNvPr id="31" name="ZoneTexte 30">
               <a:extLst>
                 <a:ext uri="{FF2B5EF4-FFF2-40B4-BE49-F238E27FC236}">
-                  <a16:creationId xmlns:a16="http://schemas.microsoft.com/office/drawing/2014/main" xmlns="" id="{94FA61C2-B84D-4556-BEC7-664B4B1053EB}"/>
+                  <a16:creationId xmlns="" xmlns:a16="http://schemas.microsoft.com/office/drawing/2014/main" id="{94FA61C2-B84D-4556-BEC7-664B4B1053EB}"/>
                 </a:ext>
               </a:extLst>
             </p:cNvPr>
@@ -11832,7 +12002,7 @@
             <p:cNvPr id="32" name="ZoneTexte 31">
               <a:extLst>
                 <a:ext uri="{FF2B5EF4-FFF2-40B4-BE49-F238E27FC236}">
-                  <a16:creationId xmlns:a16="http://schemas.microsoft.com/office/drawing/2014/main" xmlns="" id="{94FA61C2-B84D-4556-BEC7-664B4B1053EB}"/>
+                  <a16:creationId xmlns="" xmlns:a16="http://schemas.microsoft.com/office/drawing/2014/main" id="{94FA61C2-B84D-4556-BEC7-664B4B1053EB}"/>
                 </a:ext>
               </a:extLst>
             </p:cNvPr>
@@ -11951,7 +12121,7 @@
             <p:cNvPr id="33" name="Rectangle 32">
               <a:extLst>
                 <a:ext uri="{FF2B5EF4-FFF2-40B4-BE49-F238E27FC236}">
-                  <a16:creationId xmlns:a16="http://schemas.microsoft.com/office/drawing/2014/main" xmlns="" id="{C8E014B8-8F69-45D0-BC88-472428DD5014}"/>
+                  <a16:creationId xmlns="" xmlns:a16="http://schemas.microsoft.com/office/drawing/2014/main" id="{C8E014B8-8F69-45D0-BC88-472428DD5014}"/>
                 </a:ext>
               </a:extLst>
             </p:cNvPr>
@@ -12185,7 +12355,7 @@
           <p:cNvPr id="14" name="Titre 1">
             <a:extLst>
               <a:ext uri="{FF2B5EF4-FFF2-40B4-BE49-F238E27FC236}">
-                <a16:creationId xmlns:a16="http://schemas.microsoft.com/office/drawing/2014/main" xmlns="" id="{664C0ADC-F01C-469F-B67C-D594A1C8E5EC}"/>
+                <a16:creationId xmlns="" xmlns:a16="http://schemas.microsoft.com/office/drawing/2014/main" id="{664C0ADC-F01C-469F-B67C-D594A1C8E5EC}"/>
               </a:ext>
             </a:extLst>
           </p:cNvPr>
@@ -12897,7 +13067,7 @@
           <p:cNvPr id="14" name="Titre 1">
             <a:extLst>
               <a:ext uri="{FF2B5EF4-FFF2-40B4-BE49-F238E27FC236}">
-                <a16:creationId xmlns:a16="http://schemas.microsoft.com/office/drawing/2014/main" xmlns="" id="{664C0ADC-F01C-469F-B67C-D594A1C8E5EC}"/>
+                <a16:creationId xmlns="" xmlns:a16="http://schemas.microsoft.com/office/drawing/2014/main" id="{664C0ADC-F01C-469F-B67C-D594A1C8E5EC}"/>
               </a:ext>
             </a:extLst>
           </p:cNvPr>
@@ -13314,7 +13484,7 @@
           <p:cNvPr id="14" name="Titre 1">
             <a:extLst>
               <a:ext uri="{FF2B5EF4-FFF2-40B4-BE49-F238E27FC236}">
-                <a16:creationId xmlns:a16="http://schemas.microsoft.com/office/drawing/2014/main" xmlns="" id="{664C0ADC-F01C-469F-B67C-D594A1C8E5EC}"/>
+                <a16:creationId xmlns="" xmlns:a16="http://schemas.microsoft.com/office/drawing/2014/main" id="{664C0ADC-F01C-469F-B67C-D594A1C8E5EC}"/>
               </a:ext>
             </a:extLst>
           </p:cNvPr>
@@ -13603,15 +13773,23 @@
                   <a:prstClr val="black"/>
                 </a:solidFill>
               </a:rPr>
-              <a:t>(Propose</a:t>
-            </a:r>
-            <a:r>
-              <a:rPr lang="en-US" sz="1900" dirty="0">
+              <a:t>(</a:t>
+            </a:r>
+            <a:r>
+              <a:rPr lang="en-US" sz="1900" dirty="0" smtClean="0">
                 <a:solidFill>
                   <a:prstClr val="black"/>
                 </a:solidFill>
               </a:rPr>
-              <a:t>, Reject, </a:t>
+              <a:t>Propose, </a:t>
+            </a:r>
+            <a:r>
+              <a:rPr lang="en-US" sz="1900" dirty="0" err="1" smtClean="0">
+                <a:solidFill>
+                  <a:prstClr val="black"/>
+                </a:solidFill>
+              </a:rPr>
+              <a:t>CounterPropose</a:t>
             </a:r>
             <a:r>
               <a:rPr lang="en-US" sz="1900" dirty="0" smtClean="0">
@@ -13619,8 +13797,13 @@
                   <a:prstClr val="black"/>
                 </a:solidFill>
               </a:rPr>
-              <a:t>Accept)</a:t>
-            </a:r>
+              <a:t>)</a:t>
+            </a:r>
+            <a:endParaRPr lang="en-US" sz="1900" dirty="0" smtClean="0">
+              <a:solidFill>
+                <a:prstClr val="black"/>
+              </a:solidFill>
+            </a:endParaRPr>
           </a:p>
           <a:p>
             <a:pPr lvl="1">
@@ -13659,36 +13842,28 @@
               <a:t>: </a:t>
             </a:r>
             <a:r>
-              <a:rPr lang="en-US" sz="2400" dirty="0">
+              <a:rPr lang="en-US" sz="2400" dirty="0" smtClean="0">
                 <a:solidFill>
                   <a:prstClr val="black"/>
                 </a:solidFill>
               </a:rPr>
-              <a:t>Statement </a:t>
-            </a:r>
-            <a:r>
-              <a:rPr lang="en-US" sz="2400" dirty="0" smtClean="0">
+              <a:t>Information acts </a:t>
+            </a:r>
+            <a:r>
+              <a:rPr lang="en-US" sz="1900" dirty="0" smtClean="0">
                 <a:solidFill>
                   <a:prstClr val="black"/>
                 </a:solidFill>
               </a:rPr>
-              <a:t>acts </a:t>
-            </a:r>
-            <a:r>
-              <a:rPr lang="en-US" sz="1900" dirty="0">
+              <a:t>(</a:t>
+            </a:r>
+            <a:r>
+              <a:rPr lang="en-US" sz="1900" dirty="0" err="1" smtClean="0">
                 <a:solidFill>
                   <a:prstClr val="black"/>
                 </a:solidFill>
               </a:rPr>
-              <a:t>(</a:t>
-            </a:r>
-            <a:r>
-              <a:rPr lang="en-US" sz="1900" dirty="0" err="1">
-                <a:solidFill>
-                  <a:prstClr val="black"/>
-                </a:solidFill>
-              </a:rPr>
-              <a:t>StatePreference,AskPreference</a:t>
+              <a:t>AskPreference</a:t>
             </a:r>
             <a:r>
               <a:rPr lang="en-US" sz="1900" dirty="0">
@@ -14091,7 +14266,7 @@
           <p:cNvPr id="5" name="ZoneTexte 4">
             <a:extLst>
               <a:ext uri="{FF2B5EF4-FFF2-40B4-BE49-F238E27FC236}">
-                <a16:creationId xmlns:a16="http://schemas.microsoft.com/office/drawing/2014/main" xmlns="" id="{BFFBD950-ABAB-4227-8571-72DBFF533E40}"/>
+                <a16:creationId xmlns="" xmlns:a16="http://schemas.microsoft.com/office/drawing/2014/main" id="{BFFBD950-ABAB-4227-8571-72DBFF533E40}"/>
               </a:ext>
             </a:extLst>
           </p:cNvPr>
@@ -14313,7 +14488,7 @@
           <p:cNvPr id="8" name="Rectangle 7">
             <a:extLst>
               <a:ext uri="{FF2B5EF4-FFF2-40B4-BE49-F238E27FC236}">
-                <a16:creationId xmlns:a16="http://schemas.microsoft.com/office/drawing/2014/main" xmlns="" id="{1ABAD7AF-155F-4D00-992B-CFFD4B852FF8}"/>
+                <a16:creationId xmlns="" xmlns:a16="http://schemas.microsoft.com/office/drawing/2014/main" id="{1ABAD7AF-155F-4D00-992B-CFFD4B852FF8}"/>
               </a:ext>
             </a:extLst>
           </p:cNvPr>
@@ -14622,7 +14797,7 @@
           <p:cNvPr id="5" name="ZoneTexte 4">
             <a:extLst>
               <a:ext uri="{FF2B5EF4-FFF2-40B4-BE49-F238E27FC236}">
-                <a16:creationId xmlns:a16="http://schemas.microsoft.com/office/drawing/2014/main" xmlns="" id="{BFFBD950-ABAB-4227-8571-72DBFF533E40}"/>
+                <a16:creationId xmlns="" xmlns:a16="http://schemas.microsoft.com/office/drawing/2014/main" id="{BFFBD950-ABAB-4227-8571-72DBFF533E40}"/>
               </a:ext>
             </a:extLst>
           </p:cNvPr>
@@ -14790,7 +14965,7 @@
           <p:cNvPr id="6" name="Rectangle 5">
             <a:extLst>
               <a:ext uri="{FF2B5EF4-FFF2-40B4-BE49-F238E27FC236}">
-                <a16:creationId xmlns:a16="http://schemas.microsoft.com/office/drawing/2014/main" xmlns="" id="{1ABAD7AF-155F-4D00-992B-CFFD4B852FF8}"/>
+                <a16:creationId xmlns="" xmlns:a16="http://schemas.microsoft.com/office/drawing/2014/main" id="{1ABAD7AF-155F-4D00-992B-CFFD4B852FF8}"/>
               </a:ext>
             </a:extLst>
           </p:cNvPr>
@@ -14873,7 +15048,7 @@
           <p:cNvPr id="10" name="ZoneTexte 9">
             <a:extLst>
               <a:ext uri="{FF2B5EF4-FFF2-40B4-BE49-F238E27FC236}">
-                <a16:creationId xmlns:a16="http://schemas.microsoft.com/office/drawing/2014/main" xmlns="" id="{4DA97B8E-52E8-4E09-951C-B73407A35AAD}"/>
+                <a16:creationId xmlns="" xmlns:a16="http://schemas.microsoft.com/office/drawing/2014/main" id="{4DA97B8E-52E8-4E09-951C-B73407A35AAD}"/>
               </a:ext>
             </a:extLst>
           </p:cNvPr>
@@ -14920,7 +15095,7 @@
           <p:cNvPr id="11" name="Titre 1">
             <a:extLst>
               <a:ext uri="{FF2B5EF4-FFF2-40B4-BE49-F238E27FC236}">
-                <a16:creationId xmlns:a16="http://schemas.microsoft.com/office/drawing/2014/main" xmlns="" id="{E2BCD793-A108-4B0C-AFD6-572492896B53}"/>
+                <a16:creationId xmlns="" xmlns:a16="http://schemas.microsoft.com/office/drawing/2014/main" id="{E2BCD793-A108-4B0C-AFD6-572492896B53}"/>
               </a:ext>
             </a:extLst>
           </p:cNvPr>
@@ -15299,7 +15474,7 @@
           <p:cNvPr id="5" name="ZoneTexte 4">
             <a:extLst>
               <a:ext uri="{FF2B5EF4-FFF2-40B4-BE49-F238E27FC236}">
-                <a16:creationId xmlns:a16="http://schemas.microsoft.com/office/drawing/2014/main" xmlns="" id="{BFFBD950-ABAB-4227-8571-72DBFF533E40}"/>
+                <a16:creationId xmlns="" xmlns:a16="http://schemas.microsoft.com/office/drawing/2014/main" id="{BFFBD950-ABAB-4227-8571-72DBFF533E40}"/>
               </a:ext>
             </a:extLst>
           </p:cNvPr>
@@ -15511,7 +15686,7 @@
           <p:cNvPr id="6" name="Rectangle 5">
             <a:extLst>
               <a:ext uri="{FF2B5EF4-FFF2-40B4-BE49-F238E27FC236}">
-                <a16:creationId xmlns:a16="http://schemas.microsoft.com/office/drawing/2014/main" xmlns="" id="{1ABAD7AF-155F-4D00-992B-CFFD4B852FF8}"/>
+                <a16:creationId xmlns="" xmlns:a16="http://schemas.microsoft.com/office/drawing/2014/main" id="{1ABAD7AF-155F-4D00-992B-CFFD4B852FF8}"/>
               </a:ext>
             </a:extLst>
           </p:cNvPr>
@@ -15594,7 +15769,7 @@
           <p:cNvPr id="10" name="ZoneTexte 9">
             <a:extLst>
               <a:ext uri="{FF2B5EF4-FFF2-40B4-BE49-F238E27FC236}">
-                <a16:creationId xmlns:a16="http://schemas.microsoft.com/office/drawing/2014/main" xmlns="" id="{4DA97B8E-52E8-4E09-951C-B73407A35AAD}"/>
+                <a16:creationId xmlns="" xmlns:a16="http://schemas.microsoft.com/office/drawing/2014/main" id="{4DA97B8E-52E8-4E09-951C-B73407A35AAD}"/>
               </a:ext>
             </a:extLst>
           </p:cNvPr>
@@ -15641,7 +15816,7 @@
           <p:cNvPr id="11" name="Titre 1">
             <a:extLst>
               <a:ext uri="{FF2B5EF4-FFF2-40B4-BE49-F238E27FC236}">
-                <a16:creationId xmlns:a16="http://schemas.microsoft.com/office/drawing/2014/main" xmlns="" id="{E2BCD793-A108-4B0C-AFD6-572492896B53}"/>
+                <a16:creationId xmlns="" xmlns:a16="http://schemas.microsoft.com/office/drawing/2014/main" id="{E2BCD793-A108-4B0C-AFD6-572492896B53}"/>
               </a:ext>
             </a:extLst>
           </p:cNvPr>
@@ -15719,11 +15894,7 @@
             <a:pPr algn="ctr"/>
             <a:r>
               <a:rPr lang="en-US" sz="2000" dirty="0" smtClean="0"/>
-              <a:t>Principle </a:t>
-            </a:r>
-            <a:r>
-              <a:rPr lang="en-US" sz="2000" dirty="0" smtClean="0"/>
-              <a:t>2: self-centeredness</a:t>
+              <a:t>Principle 2: self-centeredness</a:t>
             </a:r>
             <a:endParaRPr lang="en-US" sz="2000" dirty="0"/>
           </a:p>
@@ -15936,7 +16107,7 @@
           <p:cNvPr id="5" name="ZoneTexte 4">
             <a:extLst>
               <a:ext uri="{FF2B5EF4-FFF2-40B4-BE49-F238E27FC236}">
-                <a16:creationId xmlns:a16="http://schemas.microsoft.com/office/drawing/2014/main" xmlns="" id="{BFFBD950-ABAB-4227-8571-72DBFF533E40}"/>
+                <a16:creationId xmlns="" xmlns:a16="http://schemas.microsoft.com/office/drawing/2014/main" id="{BFFBD950-ABAB-4227-8571-72DBFF533E40}"/>
               </a:ext>
             </a:extLst>
           </p:cNvPr>
@@ -16360,7 +16531,7 @@
           <p:cNvPr id="18" name="ZoneTexte 17">
             <a:extLst>
               <a:ext uri="{FF2B5EF4-FFF2-40B4-BE49-F238E27FC236}">
-                <a16:creationId xmlns:a16="http://schemas.microsoft.com/office/drawing/2014/main" xmlns="" id="{C3B3ABE3-9EC2-469E-873C-A5C62C684DF1}"/>
+                <a16:creationId xmlns="" xmlns:a16="http://schemas.microsoft.com/office/drawing/2014/main" id="{C3B3ABE3-9EC2-469E-873C-A5C62C684DF1}"/>
               </a:ext>
             </a:extLst>
           </p:cNvPr>
@@ -16407,7 +16578,7 @@
           <p:cNvPr id="19" name="Titre 1">
             <a:extLst>
               <a:ext uri="{FF2B5EF4-FFF2-40B4-BE49-F238E27FC236}">
-                <a16:creationId xmlns:a16="http://schemas.microsoft.com/office/drawing/2014/main" xmlns="" id="{12BDFC3C-1C01-4160-B20B-AB98DD070716}"/>
+                <a16:creationId xmlns="" xmlns:a16="http://schemas.microsoft.com/office/drawing/2014/main" id="{12BDFC3C-1C01-4160-B20B-AB98DD070716}"/>
               </a:ext>
             </a:extLst>
           </p:cNvPr>
@@ -16446,7 +16617,7 @@
           <p:cNvPr id="14" name="Rectangle 13">
             <a:extLst>
               <a:ext uri="{FF2B5EF4-FFF2-40B4-BE49-F238E27FC236}">
-                <a16:creationId xmlns:a16="http://schemas.microsoft.com/office/drawing/2014/main" xmlns="" id="{1ABAD7AF-155F-4D00-992B-CFFD4B852FF8}"/>
+                <a16:creationId xmlns="" xmlns:a16="http://schemas.microsoft.com/office/drawing/2014/main" id="{1ABAD7AF-155F-4D00-992B-CFFD4B852FF8}"/>
               </a:ext>
             </a:extLst>
           </p:cNvPr>
@@ -16788,7 +16959,7 @@
           <p:cNvPr id="5" name="ZoneTexte 4">
             <a:extLst>
               <a:ext uri="{FF2B5EF4-FFF2-40B4-BE49-F238E27FC236}">
-                <a16:creationId xmlns:a16="http://schemas.microsoft.com/office/drawing/2014/main" xmlns="" id="{BFFBD950-ABAB-4227-8571-72DBFF533E40}"/>
+                <a16:creationId xmlns="" xmlns:a16="http://schemas.microsoft.com/office/drawing/2014/main" id="{BFFBD950-ABAB-4227-8571-72DBFF533E40}"/>
               </a:ext>
             </a:extLst>
           </p:cNvPr>
@@ -17120,7 +17291,7 @@
           <p:cNvPr id="15" name="ZoneTexte 14">
             <a:extLst>
               <a:ext uri="{FF2B5EF4-FFF2-40B4-BE49-F238E27FC236}">
-                <a16:creationId xmlns:a16="http://schemas.microsoft.com/office/drawing/2014/main" xmlns="" id="{2A3FAC5F-7CCF-4FA4-911D-8A5574188D63}"/>
+                <a16:creationId xmlns="" xmlns:a16="http://schemas.microsoft.com/office/drawing/2014/main" id="{2A3FAC5F-7CCF-4FA4-911D-8A5574188D63}"/>
               </a:ext>
             </a:extLst>
           </p:cNvPr>
@@ -17167,7 +17338,7 @@
           <p:cNvPr id="17" name="Titre 1">
             <a:extLst>
               <a:ext uri="{FF2B5EF4-FFF2-40B4-BE49-F238E27FC236}">
-                <a16:creationId xmlns:a16="http://schemas.microsoft.com/office/drawing/2014/main" xmlns="" id="{74C4F468-574E-4102-B88C-E9B4EBDA6580}"/>
+                <a16:creationId xmlns="" xmlns:a16="http://schemas.microsoft.com/office/drawing/2014/main" id="{74C4F468-574E-4102-B88C-E9B4EBDA6580}"/>
               </a:ext>
             </a:extLst>
           </p:cNvPr>
@@ -17206,7 +17377,7 @@
           <p:cNvPr id="14" name="Rectangle 13">
             <a:extLst>
               <a:ext uri="{FF2B5EF4-FFF2-40B4-BE49-F238E27FC236}">
-                <a16:creationId xmlns:a16="http://schemas.microsoft.com/office/drawing/2014/main" xmlns="" id="{1ABAD7AF-155F-4D00-992B-CFFD4B852FF8}"/>
+                <a16:creationId xmlns="" xmlns:a16="http://schemas.microsoft.com/office/drawing/2014/main" id="{1ABAD7AF-155F-4D00-992B-CFFD4B852FF8}"/>
               </a:ext>
             </a:extLst>
           </p:cNvPr>
@@ -17655,8 +17826,8 @@
         </p:nvSpPr>
         <p:spPr>
           <a:xfrm>
-            <a:off x="395536" y="2276872"/>
-            <a:ext cx="8229600" cy="3940696"/>
+            <a:off x="971600" y="2276872"/>
+            <a:ext cx="7776864" cy="3940696"/>
           </a:xfrm>
         </p:spPr>
         <p:txBody>
@@ -17823,7 +17994,7 @@
           <p:cNvPr id="9" name="ZoneTexte 8">
             <a:extLst>
               <a:ext uri="{FF2B5EF4-FFF2-40B4-BE49-F238E27FC236}">
-                <a16:creationId xmlns:a16="http://schemas.microsoft.com/office/drawing/2014/main" xmlns="" id="{1AB175FA-037C-4BE2-A9EF-E9F07923A9FF}"/>
+                <a16:creationId xmlns="" xmlns:a16="http://schemas.microsoft.com/office/drawing/2014/main" id="{1AB175FA-037C-4BE2-A9EF-E9F07923A9FF}"/>
               </a:ext>
             </a:extLst>
           </p:cNvPr>
@@ -17862,7 +18033,7 @@
           <p:cNvPr id="10" name="Titre 1">
             <a:extLst>
               <a:ext uri="{FF2B5EF4-FFF2-40B4-BE49-F238E27FC236}">
-                <a16:creationId xmlns:a16="http://schemas.microsoft.com/office/drawing/2014/main" xmlns="" id="{1DF4CD20-F84B-4D07-BAE8-6A1045430AD7}"/>
+                <a16:creationId xmlns="" xmlns:a16="http://schemas.microsoft.com/office/drawing/2014/main" id="{1DF4CD20-F84B-4D07-BAE8-6A1045430AD7}"/>
               </a:ext>
             </a:extLst>
           </p:cNvPr>
@@ -17947,6 +18118,190 @@
               <a:t> Evaluate the perception of behaviors related of power.</a:t>
             </a:r>
             <a:endParaRPr lang="fr-FR" sz="2600" dirty="0"/>
+          </a:p>
+        </p:txBody>
+      </p:sp>
+      <p:sp>
+        <p:nvSpPr>
+          <p:cNvPr id="6" name="Flèche droite 5"/>
+          <p:cNvSpPr/>
+          <p:nvPr/>
+        </p:nvSpPr>
+        <p:spPr>
+          <a:xfrm>
+            <a:off x="91386" y="2646149"/>
+            <a:ext cx="1168246" cy="648072"/>
+          </a:xfrm>
+          <a:prstGeom prst="rightArrow">
+            <a:avLst/>
+          </a:prstGeom>
+          <a:ln w="19050"/>
+        </p:spPr>
+        <p:style>
+          <a:lnRef idx="2">
+            <a:schemeClr val="accent2"/>
+          </a:lnRef>
+          <a:fillRef idx="1">
+            <a:schemeClr val="lt1"/>
+          </a:fillRef>
+          <a:effectRef idx="0">
+            <a:schemeClr val="accent2"/>
+          </a:effectRef>
+          <a:fontRef idx="minor">
+            <a:schemeClr val="dk1"/>
+          </a:fontRef>
+        </p:style>
+        <p:txBody>
+          <a:bodyPr rtlCol="0" anchor="ctr"/>
+          <a:lstStyle/>
+          <a:p>
+            <a:pPr algn="ctr"/>
+            <a:r>
+              <a:rPr lang="fr-FR" b="1" dirty="0" err="1" smtClean="0"/>
+              <a:t>Prin</a:t>
+            </a:r>
+            <a:r>
+              <a:rPr lang="fr-FR" b="1" dirty="0" smtClean="0"/>
+              <a:t>. 2</a:t>
+            </a:r>
+            <a:endParaRPr lang="fr-FR" b="1" dirty="0"/>
+          </a:p>
+        </p:txBody>
+      </p:sp>
+      <p:sp>
+        <p:nvSpPr>
+          <p:cNvPr id="11" name="Flèche droite 10"/>
+          <p:cNvSpPr/>
+          <p:nvPr/>
+        </p:nvSpPr>
+        <p:spPr>
+          <a:xfrm>
+            <a:off x="59229" y="5733256"/>
+            <a:ext cx="1168246" cy="648072"/>
+          </a:xfrm>
+          <a:prstGeom prst="rightArrow">
+            <a:avLst/>
+          </a:prstGeom>
+          <a:ln w="19050"/>
+        </p:spPr>
+        <p:style>
+          <a:lnRef idx="2">
+            <a:schemeClr val="accent2"/>
+          </a:lnRef>
+          <a:fillRef idx="1">
+            <a:schemeClr val="lt1"/>
+          </a:fillRef>
+          <a:effectRef idx="0">
+            <a:schemeClr val="accent2"/>
+          </a:effectRef>
+          <a:fontRef idx="minor">
+            <a:schemeClr val="dk1"/>
+          </a:fontRef>
+        </p:style>
+        <p:txBody>
+          <a:bodyPr rtlCol="0" anchor="ctr"/>
+          <a:lstStyle/>
+          <a:p>
+            <a:pPr algn="ctr"/>
+            <a:r>
+              <a:rPr lang="fr-FR" b="1" dirty="0" err="1" smtClean="0"/>
+              <a:t>Prin</a:t>
+            </a:r>
+            <a:r>
+              <a:rPr lang="fr-FR" b="1" dirty="0" smtClean="0"/>
+              <a:t>. 3</a:t>
+            </a:r>
+            <a:endParaRPr lang="fr-FR" b="1" dirty="0"/>
+          </a:p>
+        </p:txBody>
+      </p:sp>
+      <p:sp>
+        <p:nvSpPr>
+          <p:cNvPr id="7" name="Accolade ouvrante 6"/>
+          <p:cNvSpPr/>
+          <p:nvPr/>
+        </p:nvSpPr>
+        <p:spPr>
+          <a:xfrm>
+            <a:off x="1115616" y="3789040"/>
+            <a:ext cx="288032" cy="1512168"/>
+          </a:xfrm>
+          <a:prstGeom prst="leftBrace">
+            <a:avLst/>
+          </a:prstGeom>
+          <a:ln w="19050"/>
+        </p:spPr>
+        <p:style>
+          <a:lnRef idx="2">
+            <a:schemeClr val="accent2"/>
+          </a:lnRef>
+          <a:fillRef idx="1">
+            <a:schemeClr val="lt1"/>
+          </a:fillRef>
+          <a:effectRef idx="0">
+            <a:schemeClr val="accent2"/>
+          </a:effectRef>
+          <a:fontRef idx="minor">
+            <a:schemeClr val="dk1"/>
+          </a:fontRef>
+        </p:style>
+        <p:txBody>
+          <a:bodyPr rtlCol="0" anchor="ctr"/>
+          <a:lstStyle/>
+          <a:p>
+            <a:pPr algn="ctr"/>
+            <a:endParaRPr lang="fr-FR" b="1">
+              <a:solidFill>
+                <a:schemeClr val="dk1"/>
+              </a:solidFill>
+            </a:endParaRPr>
+          </a:p>
+        </p:txBody>
+      </p:sp>
+      <p:sp>
+        <p:nvSpPr>
+          <p:cNvPr id="12" name="Flèche droite 11"/>
+          <p:cNvSpPr/>
+          <p:nvPr/>
+        </p:nvSpPr>
+        <p:spPr>
+          <a:xfrm>
+            <a:off x="91386" y="4221088"/>
+            <a:ext cx="1168246" cy="648072"/>
+          </a:xfrm>
+          <a:prstGeom prst="rightArrow">
+            <a:avLst/>
+          </a:prstGeom>
+          <a:ln w="19050"/>
+        </p:spPr>
+        <p:style>
+          <a:lnRef idx="2">
+            <a:schemeClr val="accent2"/>
+          </a:lnRef>
+          <a:fillRef idx="1">
+            <a:schemeClr val="lt1"/>
+          </a:fillRef>
+          <a:effectRef idx="0">
+            <a:schemeClr val="accent2"/>
+          </a:effectRef>
+          <a:fontRef idx="minor">
+            <a:schemeClr val="dk1"/>
+          </a:fontRef>
+        </p:style>
+        <p:txBody>
+          <a:bodyPr rtlCol="0" anchor="ctr"/>
+          <a:lstStyle/>
+          <a:p>
+            <a:pPr algn="ctr"/>
+            <a:r>
+              <a:rPr lang="fr-FR" b="1" dirty="0" err="1" smtClean="0"/>
+              <a:t>Prin</a:t>
+            </a:r>
+            <a:r>
+              <a:rPr lang="fr-FR" b="1" dirty="0" smtClean="0"/>
+              <a:t>. 1</a:t>
+            </a:r>
+            <a:endParaRPr lang="fr-FR" b="1" dirty="0"/>
           </a:p>
         </p:txBody>
       </p:sp>
@@ -18447,7 +18802,7 @@
             <p:cNvPr id="13" name="Picture 2">
               <a:extLst>
                 <a:ext uri="{FF2B5EF4-FFF2-40B4-BE49-F238E27FC236}">
-                  <a16:creationId xmlns:a16="http://schemas.microsoft.com/office/drawing/2014/main" xmlns="" id="{1073412C-BD31-4FF8-81F8-7E47107A6CEC}"/>
+                  <a16:creationId xmlns="" xmlns:a16="http://schemas.microsoft.com/office/drawing/2014/main" id="{1073412C-BD31-4FF8-81F8-7E47107A6CEC}"/>
                 </a:ext>
               </a:extLst>
             </p:cNvPr>
@@ -18502,7 +18857,7 @@
             <p:cNvPr id="14" name="Picture 2">
               <a:extLst>
                 <a:ext uri="{FF2B5EF4-FFF2-40B4-BE49-F238E27FC236}">
-                  <a16:creationId xmlns:a16="http://schemas.microsoft.com/office/drawing/2014/main" xmlns="" id="{1073412C-BD31-4FF8-81F8-7E47107A6CEC}"/>
+                  <a16:creationId xmlns="" xmlns:a16="http://schemas.microsoft.com/office/drawing/2014/main" id="{1073412C-BD31-4FF8-81F8-7E47107A6CEC}"/>
                 </a:ext>
               </a:extLst>
             </p:cNvPr>
@@ -18972,7 +19327,7 @@
           <p:cNvPr id="21" name="Titre 1">
             <a:extLst>
               <a:ext uri="{FF2B5EF4-FFF2-40B4-BE49-F238E27FC236}">
-                <a16:creationId xmlns:a16="http://schemas.microsoft.com/office/drawing/2014/main" xmlns="" id="{E55D5E34-0B49-4B7D-9777-837B855953CF}"/>
+                <a16:creationId xmlns="" xmlns:a16="http://schemas.microsoft.com/office/drawing/2014/main" id="{E55D5E34-0B49-4B7D-9777-837B855953CF}"/>
               </a:ext>
             </a:extLst>
           </p:cNvPr>
@@ -19039,7 +19394,7 @@
           <p:cNvPr id="23" name="Image 22">
             <a:extLst>
               <a:ext uri="{FF2B5EF4-FFF2-40B4-BE49-F238E27FC236}">
-                <a16:creationId xmlns:a16="http://schemas.microsoft.com/office/drawing/2014/main" xmlns="" id="{D53D89F2-AE8A-477A-A2F9-C334D7FE89CE}"/>
+                <a16:creationId xmlns="" xmlns:a16="http://schemas.microsoft.com/office/drawing/2014/main" id="{D53D89F2-AE8A-477A-A2F9-C334D7FE89CE}"/>
               </a:ext>
             </a:extLst>
           </p:cNvPr>
@@ -19080,7 +19435,7 @@
           <p:cNvPr id="25" name="Image 24">
             <a:extLst>
               <a:ext uri="{FF2B5EF4-FFF2-40B4-BE49-F238E27FC236}">
-                <a16:creationId xmlns:a16="http://schemas.microsoft.com/office/drawing/2014/main" xmlns="" id="{28731151-DA40-43DD-B470-598CF86726A8}"/>
+                <a16:creationId xmlns="" xmlns:a16="http://schemas.microsoft.com/office/drawing/2014/main" id="{28731151-DA40-43DD-B470-598CF86726A8}"/>
               </a:ext>
             </a:extLst>
           </p:cNvPr>
@@ -19189,8 +19544,8 @@
         </p:nvSpPr>
         <p:spPr>
           <a:xfrm>
-            <a:off x="251520" y="5229200"/>
-            <a:ext cx="8117882" cy="1107996"/>
+            <a:off x="1" y="5229200"/>
+            <a:ext cx="9024702" cy="1107996"/>
           </a:xfrm>
           <a:prstGeom prst="rect">
             <a:avLst/>
@@ -19224,13 +19579,18 @@
               <a:buChar char="•"/>
             </a:pPr>
             <a:r>
-              <a:rPr lang="en-US" sz="2200"/>
-              <a:t>Agent A </a:t>
-            </a:r>
-            <a:r>
               <a:rPr lang="en-US" sz="2200" dirty="0"/>
-              <a:t>is the one who leads the dialogue.</a:t>
-            </a:r>
+              <a:t>Agent A is the one who leads the dialogue</a:t>
+            </a:r>
+            <a:r>
+              <a:rPr lang="en-US" sz="2200" dirty="0" smtClean="0"/>
+              <a:t>. </a:t>
+            </a:r>
+            <a:r>
+              <a:rPr lang="en-US" dirty="0" smtClean="0"/>
+              <a:t>(even in the similar condition)</a:t>
+            </a:r>
+            <a:endParaRPr lang="en-US" sz="2200" dirty="0"/>
           </a:p>
         </p:txBody>
       </p:sp>
@@ -19305,7 +19665,7 @@
           <p:cNvPr id="24" name="ZoneTexte 23">
             <a:extLst>
               <a:ext uri="{FF2B5EF4-FFF2-40B4-BE49-F238E27FC236}">
-                <a16:creationId xmlns:a16="http://schemas.microsoft.com/office/drawing/2014/main" xmlns="" id="{96C63FE5-CD8F-440F-B2CB-101C2D901C66}"/>
+                <a16:creationId xmlns="" xmlns:a16="http://schemas.microsoft.com/office/drawing/2014/main" id="{96C63FE5-CD8F-440F-B2CB-101C2D901C66}"/>
               </a:ext>
             </a:extLst>
           </p:cNvPr>
@@ -19340,7 +19700,7 @@
           <p:cNvPr id="25" name="ZoneTexte 24">
             <a:extLst>
               <a:ext uri="{FF2B5EF4-FFF2-40B4-BE49-F238E27FC236}">
-                <a16:creationId xmlns:a16="http://schemas.microsoft.com/office/drawing/2014/main" xmlns="" id="{AAE40979-FF86-497A-AF1B-F1BBA2073296}"/>
+                <a16:creationId xmlns="" xmlns:a16="http://schemas.microsoft.com/office/drawing/2014/main" id="{AAE40979-FF86-497A-AF1B-F1BBA2073296}"/>
               </a:ext>
             </a:extLst>
           </p:cNvPr>
@@ -19375,7 +19735,7 @@
           <p:cNvPr id="32" name="Image 31">
             <a:extLst>
               <a:ext uri="{FF2B5EF4-FFF2-40B4-BE49-F238E27FC236}">
-                <a16:creationId xmlns:a16="http://schemas.microsoft.com/office/drawing/2014/main" xmlns="" id="{B8A974C1-7045-429E-9D7C-82B146B3CF72}"/>
+                <a16:creationId xmlns="" xmlns:a16="http://schemas.microsoft.com/office/drawing/2014/main" id="{B8A974C1-7045-429E-9D7C-82B146B3CF72}"/>
               </a:ext>
             </a:extLst>
           </p:cNvPr>
@@ -19416,7 +19776,7 @@
           <p:cNvPr id="34" name="Image 33">
             <a:extLst>
               <a:ext uri="{FF2B5EF4-FFF2-40B4-BE49-F238E27FC236}">
-                <a16:creationId xmlns:a16="http://schemas.microsoft.com/office/drawing/2014/main" xmlns="" id="{24B0011C-3FE1-48A9-8B0A-9BDF277EDAB6}"/>
+                <a16:creationId xmlns="" xmlns:a16="http://schemas.microsoft.com/office/drawing/2014/main" id="{24B0011C-3FE1-48A9-8B0A-9BDF277EDAB6}"/>
               </a:ext>
             </a:extLst>
           </p:cNvPr>
@@ -20235,7 +20595,7 @@
           <p:cNvPr id="28" name="Image 27">
             <a:extLst>
               <a:ext uri="{FF2B5EF4-FFF2-40B4-BE49-F238E27FC236}">
-                <a16:creationId xmlns:a16="http://schemas.microsoft.com/office/drawing/2014/main" xmlns="" id="{99BDECA0-3950-4C91-975C-5B29FE64CC39}"/>
+                <a16:creationId xmlns="" xmlns:a16="http://schemas.microsoft.com/office/drawing/2014/main" id="{99BDECA0-3950-4C91-975C-5B29FE64CC39}"/>
               </a:ext>
             </a:extLst>
           </p:cNvPr>
@@ -20772,7 +21132,7 @@
           <p:cNvPr id="2" name="Rectangle 1">
             <a:extLst>
               <a:ext uri="{FF2B5EF4-FFF2-40B4-BE49-F238E27FC236}">
-                <a16:creationId xmlns:a16="http://schemas.microsoft.com/office/drawing/2014/main" xmlns="" id="{F27C5ECE-A7E9-4F97-8CFC-2D1207980563}"/>
+                <a16:creationId xmlns="" xmlns:a16="http://schemas.microsoft.com/office/drawing/2014/main" id="{F27C5ECE-A7E9-4F97-8CFC-2D1207980563}"/>
               </a:ext>
             </a:extLst>
           </p:cNvPr>
@@ -21053,16 +21413,13 @@
               <a:buFont typeface="+mj-lt"/>
               <a:buAutoNum type="romanLcPeriod"/>
             </a:pPr>
-            <a:endParaRPr lang="en-US" sz="2400" dirty="0"/>
-          </a:p>
-          <a:p>
-            <a:pPr marL="514350" indent="-514350">
-              <a:buFont typeface="+mj-lt"/>
-              <a:buAutoNum type="arabicPeriod"/>
-            </a:pPr>
+            <a:r>
+              <a:rPr lang="en-US" sz="2800" dirty="0" smtClean="0"/>
+              <a:t>Validate </a:t>
+            </a:r>
             <a:r>
               <a:rPr lang="en-US" sz="2800" dirty="0"/>
-              <a:t>Validate the </a:t>
+              <a:t>the </a:t>
             </a:r>
             <a:r>
               <a:rPr lang="en-US" sz="2800" dirty="0" smtClean="0"/>
@@ -21080,7 +21437,7 @@
           <p:cNvPr id="2" name="Rectangle 1">
             <a:extLst>
               <a:ext uri="{FF2B5EF4-FFF2-40B4-BE49-F238E27FC236}">
-                <a16:creationId xmlns:a16="http://schemas.microsoft.com/office/drawing/2014/main" xmlns="" id="{F27C5ECE-A7E9-4F97-8CFC-2D1207980563}"/>
+                <a16:creationId xmlns="" xmlns:a16="http://schemas.microsoft.com/office/drawing/2014/main" id="{F27C5ECE-A7E9-4F97-8CFC-2D1207980563}"/>
               </a:ext>
             </a:extLst>
           </p:cNvPr>
@@ -22221,7 +22578,7 @@
           <p:cNvPr id="17" name="Picture 2">
             <a:extLst>
               <a:ext uri="{FF2B5EF4-FFF2-40B4-BE49-F238E27FC236}">
-                <a16:creationId xmlns:a16="http://schemas.microsoft.com/office/drawing/2014/main" xmlns="" id="{CFF8B845-5BF8-4A0C-98F6-B619715AAEA2}"/>
+                <a16:creationId xmlns="" xmlns:a16="http://schemas.microsoft.com/office/drawing/2014/main" id="{CFF8B845-5BF8-4A0C-98F6-B619715AAEA2}"/>
               </a:ext>
             </a:extLst>
           </p:cNvPr>
@@ -22283,7 +22640,7 @@
           <p:cNvPr id="18" name="Picture 3">
             <a:extLst>
               <a:ext uri="{FF2B5EF4-FFF2-40B4-BE49-F238E27FC236}">
-                <a16:creationId xmlns:a16="http://schemas.microsoft.com/office/drawing/2014/main" xmlns="" id="{EF2EBBBE-8593-44B1-A72D-A22E9C08FFE7}"/>
+                <a16:creationId xmlns="" xmlns:a16="http://schemas.microsoft.com/office/drawing/2014/main" id="{EF2EBBBE-8593-44B1-A72D-A22E9C08FFE7}"/>
               </a:ext>
             </a:extLst>
           </p:cNvPr>
@@ -22343,7 +22700,7 @@
           <p:cNvPr id="19" name="Rectangle 18">
             <a:extLst>
               <a:ext uri="{FF2B5EF4-FFF2-40B4-BE49-F238E27FC236}">
-                <a16:creationId xmlns:a16="http://schemas.microsoft.com/office/drawing/2014/main" xmlns="" id="{038F1302-F2F7-4CF9-9C4C-50FE7FDCDB4F}"/>
+                <a16:creationId xmlns="" xmlns:a16="http://schemas.microsoft.com/office/drawing/2014/main" id="{038F1302-F2F7-4CF9-9C4C-50FE7FDCDB4F}"/>
               </a:ext>
             </a:extLst>
           </p:cNvPr>
@@ -22402,7 +22759,7 @@
           <p:cNvPr id="20" name="Rectangle 19">
             <a:extLst>
               <a:ext uri="{FF2B5EF4-FFF2-40B4-BE49-F238E27FC236}">
-                <a16:creationId xmlns:a16="http://schemas.microsoft.com/office/drawing/2014/main" xmlns="" id="{3C1AA41B-074B-4F7A-861E-89735F345CF0}"/>
+                <a16:creationId xmlns="" xmlns:a16="http://schemas.microsoft.com/office/drawing/2014/main" id="{3C1AA41B-074B-4F7A-861E-89735F345CF0}"/>
               </a:ext>
             </a:extLst>
           </p:cNvPr>
@@ -22466,7 +22823,7 @@
           <p:cNvPr id="21" name="Rectangle 20">
             <a:extLst>
               <a:ext uri="{FF2B5EF4-FFF2-40B4-BE49-F238E27FC236}">
-                <a16:creationId xmlns:a16="http://schemas.microsoft.com/office/drawing/2014/main" xmlns="" id="{2A756D34-B002-4AB4-AC49-78249344A7BE}"/>
+                <a16:creationId xmlns="" xmlns:a16="http://schemas.microsoft.com/office/drawing/2014/main" id="{2A756D34-B002-4AB4-AC49-78249344A7BE}"/>
               </a:ext>
             </a:extLst>
           </p:cNvPr>
@@ -22525,7 +22882,7 @@
           <p:cNvPr id="22" name="Rectangle 21">
             <a:extLst>
               <a:ext uri="{FF2B5EF4-FFF2-40B4-BE49-F238E27FC236}">
-                <a16:creationId xmlns:a16="http://schemas.microsoft.com/office/drawing/2014/main" xmlns="" id="{9D26596C-72BB-42BF-B369-6121898FA7F5}"/>
+                <a16:creationId xmlns="" xmlns:a16="http://schemas.microsoft.com/office/drawing/2014/main" id="{9D26596C-72BB-42BF-B369-6121898FA7F5}"/>
               </a:ext>
             </a:extLst>
           </p:cNvPr>
@@ -22589,7 +22946,7 @@
           <p:cNvPr id="23" name="Double flèche horizontale 6">
             <a:extLst>
               <a:ext uri="{FF2B5EF4-FFF2-40B4-BE49-F238E27FC236}">
-                <a16:creationId xmlns:a16="http://schemas.microsoft.com/office/drawing/2014/main" xmlns="" id="{AF2A9A22-A058-4C7A-BC4B-F53D47BCE5B2}"/>
+                <a16:creationId xmlns="" xmlns:a16="http://schemas.microsoft.com/office/drawing/2014/main" id="{AF2A9A22-A058-4C7A-BC4B-F53D47BCE5B2}"/>
               </a:ext>
             </a:extLst>
           </p:cNvPr>
@@ -22788,7 +23145,7 @@
         <p:spPr>
           <a:xfrm>
             <a:off x="323528" y="1709928"/>
-            <a:ext cx="5184576" cy="3064848"/>
+            <a:ext cx="5400600" cy="4527384"/>
           </a:xfrm>
           <a:prstGeom prst="rect">
             <a:avLst/>
@@ -22834,7 +23191,7 @@
         <p:spPr>
           <a:xfrm>
             <a:off x="323528" y="1772816"/>
-            <a:ext cx="4924394" cy="3293209"/>
+            <a:ext cx="5400600" cy="4339650"/>
           </a:xfrm>
           <a:prstGeom prst="rect">
             <a:avLst/>
@@ -22848,7 +23205,7 @@
           <a:lstStyle/>
           <a:p>
             <a:r>
-              <a:rPr lang="en-US" sz="2800" b="1" dirty="0">
+              <a:rPr lang="en-US" sz="2800" b="1" dirty="0" smtClean="0">
                 <a:solidFill>
                   <a:srgbClr val="0070C0"/>
                 </a:solidFill>
@@ -22876,18 +23233,84 @@
             </a:r>
             <a:r>
               <a:rPr lang="en-US" i="1" dirty="0"/>
-              <a:t> &amp; Dunbar 98)</a:t>
-            </a:r>
-          </a:p>
-          <a:p>
-            <a:pPr lvl="1"/>
-            <a:endParaRPr lang="en-US" i="1" dirty="0"/>
+              <a:t> &amp; Dunbar </a:t>
+            </a:r>
+            <a:r>
+              <a:rPr lang="en-US" i="1" dirty="0" smtClean="0"/>
+              <a:t>98)</a:t>
+            </a:r>
           </a:p>
           <a:p>
             <a:pPr marL="800100" lvl="1" indent="-342900">
               <a:buFont typeface="Wingdings" panose="05000000000000000000" pitchFamily="2" charset="2"/>
               <a:buChar char="Ø"/>
             </a:pPr>
+            <a:endParaRPr lang="en-US" sz="2400" b="1" i="1" dirty="0">
+              <a:solidFill>
+                <a:schemeClr val="accent3"/>
+              </a:solidFill>
+            </a:endParaRPr>
+          </a:p>
+          <a:p>
+            <a:pPr marL="800100" lvl="1" indent="-342900">
+              <a:buFont typeface="Wingdings" panose="05000000000000000000" pitchFamily="2" charset="2"/>
+              <a:buChar char="Ø"/>
+            </a:pPr>
+            <a:r>
+              <a:rPr lang="en-US" sz="2400" b="1" i="1" dirty="0" smtClean="0">
+                <a:solidFill>
+                  <a:schemeClr val="accent3"/>
+                </a:solidFill>
+              </a:rPr>
+              <a:t>Power</a:t>
+            </a:r>
+            <a:r>
+              <a:rPr lang="en-US" sz="2000" b="1" i="1" dirty="0" smtClean="0">
+                <a:solidFill>
+                  <a:schemeClr val="accent3"/>
+                </a:solidFill>
+              </a:rPr>
+              <a:t> </a:t>
+            </a:r>
+            <a:r>
+              <a:rPr lang="en-US" sz="2400" i="1" dirty="0" smtClean="0"/>
+              <a:t>Ability </a:t>
+            </a:r>
+            <a:r>
+              <a:rPr lang="en-US" sz="2400" i="1" dirty="0"/>
+              <a:t>to influence the behavior of another </a:t>
+            </a:r>
+            <a:r>
+              <a:rPr lang="en-US" sz="2400" i="1" dirty="0" smtClean="0"/>
+              <a:t>person </a:t>
+            </a:r>
+            <a:r>
+              <a:rPr lang="en-US" sz="2000" i="1" dirty="0"/>
+              <a:t>(</a:t>
+            </a:r>
+            <a:r>
+              <a:rPr lang="en-US" sz="2000" i="1" dirty="0" err="1"/>
+              <a:t>Burgoon</a:t>
+            </a:r>
+            <a:r>
+              <a:rPr lang="en-US" sz="2000" i="1" dirty="0"/>
+              <a:t> et al </a:t>
+            </a:r>
+            <a:r>
+              <a:rPr lang="en-US" sz="2000" i="1" dirty="0" smtClean="0"/>
+              <a:t>98)</a:t>
+            </a:r>
+            <a:endParaRPr lang="en-US" sz="2000" i="1" dirty="0"/>
+          </a:p>
+          <a:p>
+            <a:pPr lvl="1"/>
+            <a:endParaRPr lang="en-US" i="1" dirty="0"/>
+          </a:p>
+          <a:p>
+            <a:pPr marL="800100" lvl="1" indent="-342900">
+              <a:buFont typeface="Wingdings" panose="05000000000000000000" pitchFamily="2" charset="2"/>
+              <a:buChar char="Ø"/>
+            </a:pPr>
             <a:r>
               <a:rPr lang="en-US" sz="2400" dirty="0"/>
               <a:t>Control attempts by one individual </a:t>
@@ -22922,12 +23345,21 @@
                   <a:prstClr val="black"/>
                 </a:solidFill>
               </a:rPr>
-              <a:t> &amp; Dunbar 98)</a:t>
-            </a:r>
-          </a:p>
-          <a:p>
-            <a:pPr lvl="1"/>
-            <a:endParaRPr lang="en-US" sz="2400" dirty="0"/>
+              <a:t> &amp; Dunbar 98</a:t>
+            </a:r>
+            <a:r>
+              <a:rPr lang="en-US" i="1" dirty="0" smtClean="0">
+                <a:solidFill>
+                  <a:prstClr val="black"/>
+                </a:solidFill>
+              </a:rPr>
+              <a:t>)</a:t>
+            </a:r>
+            <a:endParaRPr lang="en-US" i="1" dirty="0">
+              <a:solidFill>
+                <a:prstClr val="black"/>
+              </a:solidFill>
+            </a:endParaRPr>
           </a:p>
         </p:txBody>
       </p:sp>
@@ -22974,7 +23406,7 @@
           <p:cNvPr id="1026" name="Picture 2" descr="Image associée">
             <a:extLst>
               <a:ext uri="{FF2B5EF4-FFF2-40B4-BE49-F238E27FC236}">
-                <a16:creationId xmlns:a16="http://schemas.microsoft.com/office/drawing/2014/main" xmlns="" id="{856E596A-F57F-4174-BE45-CD01C6C9D5BE}"/>
+                <a16:creationId xmlns="" xmlns:a16="http://schemas.microsoft.com/office/drawing/2014/main" id="{856E596A-F57F-4174-BE45-CD01C6C9D5BE}"/>
               </a:ext>
             </a:extLst>
           </p:cNvPr>
@@ -22998,8 +23430,8 @@
         </p:blipFill>
         <p:spPr bwMode="auto">
           <a:xfrm>
-            <a:off x="5652120" y="1916832"/>
-            <a:ext cx="3414948" cy="2520280"/>
+            <a:off x="5932095" y="2590168"/>
+            <a:ext cx="3126916" cy="2520280"/>
           </a:xfrm>
           <a:prstGeom prst="rect">
             <a:avLst/>
@@ -23016,130 +23448,6 @@
           </a:extLst>
         </p:spPr>
       </p:pic>
-      <p:sp>
-        <p:nvSpPr>
-          <p:cNvPr id="11" name="Rectangle 10">
-            <a:extLst>
-              <a:ext uri="{FF2B5EF4-FFF2-40B4-BE49-F238E27FC236}">
-                <a16:creationId xmlns:a16="http://schemas.microsoft.com/office/drawing/2014/main" xmlns="" id="{C5E605CE-174C-4F70-A314-BBB4436AE533}"/>
-              </a:ext>
-            </a:extLst>
-          </p:cNvPr>
-          <p:cNvSpPr/>
-          <p:nvPr/>
-        </p:nvSpPr>
-        <p:spPr>
-          <a:xfrm>
-            <a:off x="323528" y="4941168"/>
-            <a:ext cx="8136904" cy="1350648"/>
-          </a:xfrm>
-          <a:prstGeom prst="rect">
-            <a:avLst/>
-          </a:prstGeom>
-          <a:noFill/>
-          <a:ln>
-            <a:solidFill>
-              <a:schemeClr val="accent1"/>
-            </a:solidFill>
-          </a:ln>
-        </p:spPr>
-        <p:style>
-          <a:lnRef idx="2">
-            <a:schemeClr val="accent1">
-              <a:shade val="50000"/>
-            </a:schemeClr>
-          </a:lnRef>
-          <a:fillRef idx="1">
-            <a:schemeClr val="accent1"/>
-          </a:fillRef>
-          <a:effectRef idx="0">
-            <a:schemeClr val="accent1"/>
-          </a:effectRef>
-          <a:fontRef idx="minor">
-            <a:schemeClr val="lt1"/>
-          </a:fontRef>
-        </p:style>
-        <p:txBody>
-          <a:bodyPr rtlCol="0" anchor="ctr"/>
-          <a:lstStyle/>
-          <a:p>
-            <a:pPr algn="ctr"/>
-            <a:endParaRPr lang="fr-FR" dirty="0"/>
-          </a:p>
-        </p:txBody>
-      </p:sp>
-      <p:sp>
-        <p:nvSpPr>
-          <p:cNvPr id="10" name="ZoneTexte 9">
-            <a:extLst>
-              <a:ext uri="{FF2B5EF4-FFF2-40B4-BE49-F238E27FC236}">
-                <a16:creationId xmlns:a16="http://schemas.microsoft.com/office/drawing/2014/main" xmlns="" id="{218F05D1-768A-4986-80EB-6525FB3CC5A0}"/>
-              </a:ext>
-            </a:extLst>
-          </p:cNvPr>
-          <p:cNvSpPr txBox="1"/>
-          <p:nvPr/>
-        </p:nvSpPr>
-        <p:spPr>
-          <a:xfrm>
-            <a:off x="503040" y="4986466"/>
-            <a:ext cx="8640960" cy="1446550"/>
-          </a:xfrm>
-          <a:prstGeom prst="rect">
-            <a:avLst/>
-          </a:prstGeom>
-          <a:noFill/>
-        </p:spPr>
-        <p:txBody>
-          <a:bodyPr wrap="square" rtlCol="0">
-            <a:spAutoFit/>
-          </a:bodyPr>
-          <a:lstStyle/>
-          <a:p>
-            <a:r>
-              <a:rPr lang="en-US" sz="2400" b="1" dirty="0">
-                <a:solidFill>
-                  <a:srgbClr val="0070C0"/>
-                </a:solidFill>
-              </a:rPr>
-              <a:t>Power</a:t>
-            </a:r>
-            <a:endParaRPr lang="en-US" sz="2000" b="1" dirty="0">
-              <a:solidFill>
-                <a:srgbClr val="0070C0"/>
-              </a:solidFill>
-            </a:endParaRPr>
-          </a:p>
-          <a:p>
-            <a:r>
-              <a:rPr lang="en-US" sz="2400" dirty="0"/>
-              <a:t>Ability to influence the behavior of another person</a:t>
-            </a:r>
-          </a:p>
-          <a:p>
-            <a:r>
-              <a:rPr lang="en-US" sz="2000" dirty="0"/>
-              <a:t> </a:t>
-            </a:r>
-            <a:r>
-              <a:rPr lang="en-US" i="1" dirty="0"/>
-              <a:t>(</a:t>
-            </a:r>
-            <a:r>
-              <a:rPr lang="en-US" i="1" dirty="0" err="1"/>
-              <a:t>Burgoon</a:t>
-            </a:r>
-            <a:r>
-              <a:rPr lang="en-US" i="1" dirty="0"/>
-              <a:t> et al 98)</a:t>
-            </a:r>
-            <a:endParaRPr lang="en-US" sz="2000" b="1" dirty="0"/>
-          </a:p>
-          <a:p>
-            <a:endParaRPr lang="fr-FR" sz="2000" dirty="0"/>
-          </a:p>
-        </p:txBody>
-      </p:sp>
     </p:spTree>
     <p:extLst>
       <p:ext uri="{BB962C8B-B14F-4D97-AF65-F5344CB8AC3E}">
@@ -23326,7 +23634,7 @@
           <p:cNvPr id="2050" name="Picture 2" descr="Résultat de recherche d'images pour &quot;Bossy or wimpy: expressing social dominance by combining gaze and linguistic behaviors&quot;">
             <a:extLst>
               <a:ext uri="{FF2B5EF4-FFF2-40B4-BE49-F238E27FC236}">
-                <a16:creationId xmlns:a16="http://schemas.microsoft.com/office/drawing/2014/main" xmlns="" id="{24C18FCD-700E-4908-A15A-C1A7C0543531}"/>
+                <a16:creationId xmlns="" xmlns:a16="http://schemas.microsoft.com/office/drawing/2014/main" id="{24C18FCD-700E-4908-A15A-C1A7C0543531}"/>
               </a:ext>
             </a:extLst>
           </p:cNvPr>
@@ -23373,7 +23681,7 @@
           <p:cNvPr id="7" name="Image 6">
             <a:extLst>
               <a:ext uri="{FF2B5EF4-FFF2-40B4-BE49-F238E27FC236}">
-                <a16:creationId xmlns:a16="http://schemas.microsoft.com/office/drawing/2014/main" xmlns="" id="{FAD6EF74-380B-4967-9F00-E19943025F33}"/>
+                <a16:creationId xmlns="" xmlns:a16="http://schemas.microsoft.com/office/drawing/2014/main" id="{FAD6EF74-380B-4967-9F00-E19943025F33}"/>
               </a:ext>
             </a:extLst>
           </p:cNvPr>
@@ -23403,7 +23711,7 @@
           <p:cNvPr id="8" name="ZoneTexte 7">
             <a:extLst>
               <a:ext uri="{FF2B5EF4-FFF2-40B4-BE49-F238E27FC236}">
-                <a16:creationId xmlns:a16="http://schemas.microsoft.com/office/drawing/2014/main" xmlns="" id="{BF819231-86B9-48FA-88B5-2863AF1A57A7}"/>
+                <a16:creationId xmlns="" xmlns:a16="http://schemas.microsoft.com/office/drawing/2014/main" id="{BF819231-86B9-48FA-88B5-2863AF1A57A7}"/>
               </a:ext>
             </a:extLst>
           </p:cNvPr>
@@ -23463,7 +23771,7 @@
           <p:cNvPr id="9" name="ZoneTexte 8">
             <a:extLst>
               <a:ext uri="{FF2B5EF4-FFF2-40B4-BE49-F238E27FC236}">
-                <a16:creationId xmlns:a16="http://schemas.microsoft.com/office/drawing/2014/main" xmlns="" id="{9D386948-6BD8-4636-95D6-1291621D7625}"/>
+                <a16:creationId xmlns="" xmlns:a16="http://schemas.microsoft.com/office/drawing/2014/main" id="{9D386948-6BD8-4636-95D6-1291621D7625}"/>
               </a:ext>
             </a:extLst>
           </p:cNvPr>

</xml_diff>